<commit_message>
Post: More progress on Homomorphisms Illustrated
</commit_message>
<xml_diff>
--- a/assets/posts/2022-12-15-homomorphism-illustrated/canvas.pptx
+++ b/assets/posts/2022-12-15-homomorphism-illustrated/canvas.pptx
@@ -3855,9 +3855,7 @@
             <a:avLst/>
           </a:prstGeom>
           <a:solidFill>
-            <a:schemeClr val="accent5">
-              <a:lumMod val="50000"/>
-            </a:schemeClr>
+            <a:srgbClr val="050244"/>
           </a:solidFill>
           <a:ln>
             <a:noFill/>
@@ -5632,50 +5630,6 @@
           </a:p>
         </p:txBody>
       </p:sp>
-      <p:cxnSp>
-        <p:nvCxnSpPr>
-          <p:cNvPr id="85" name="Straight Arrow Connector 84">
-            <a:extLst>
-              <a:ext uri="{FF2B5EF4-FFF2-40B4-BE49-F238E27FC236}">
-                <a16:creationId xmlns:a16="http://schemas.microsoft.com/office/drawing/2014/main" id="{16E00C57-76D6-5C1E-A95C-4729E5CE6B7A}"/>
-              </a:ext>
-            </a:extLst>
-          </p:cNvPr>
-          <p:cNvCxnSpPr>
-            <a:cxnSpLocks/>
-          </p:cNvCxnSpPr>
-          <p:nvPr/>
-        </p:nvCxnSpPr>
-        <p:spPr>
-          <a:xfrm>
-            <a:off x="5253036" y="2827659"/>
-            <a:ext cx="479968" cy="0"/>
-          </a:xfrm>
-          <a:prstGeom prst="straightConnector1">
-            <a:avLst/>
-          </a:prstGeom>
-          <a:ln w="34925">
-            <a:solidFill>
-              <a:srgbClr val="EF5E4F"/>
-            </a:solidFill>
-            <a:tailEnd type="triangle"/>
-          </a:ln>
-        </p:spPr>
-        <p:style>
-          <a:lnRef idx="1">
-            <a:schemeClr val="accent1"/>
-          </a:lnRef>
-          <a:fillRef idx="0">
-            <a:schemeClr val="accent1"/>
-          </a:fillRef>
-          <a:effectRef idx="0">
-            <a:schemeClr val="accent1"/>
-          </a:effectRef>
-          <a:fontRef idx="minor">
-            <a:schemeClr val="tx1"/>
-          </a:fontRef>
-        </p:style>
-      </p:cxnSp>
       <p:pic>
         <p:nvPicPr>
           <p:cNvPr id="1026" name="Picture 2">
@@ -5788,6 +5742,48 @@
           </a:extLst>
         </p:spPr>
       </p:pic>
+      <p:cxnSp>
+        <p:nvCxnSpPr>
+          <p:cNvPr id="1024" name="Straight Arrow Connector 1023">
+            <a:extLst>
+              <a:ext uri="{FF2B5EF4-FFF2-40B4-BE49-F238E27FC236}">
+                <a16:creationId xmlns:a16="http://schemas.microsoft.com/office/drawing/2014/main" id="{90D2A8DA-FD92-969C-AA12-26FC7D048E61}"/>
+              </a:ext>
+            </a:extLst>
+          </p:cNvPr>
+          <p:cNvCxnSpPr/>
+          <p:nvPr/>
+        </p:nvCxnSpPr>
+        <p:spPr>
+          <a:xfrm>
+            <a:off x="5292182" y="2827659"/>
+            <a:ext cx="413293" cy="0"/>
+          </a:xfrm>
+          <a:prstGeom prst="straightConnector1">
+            <a:avLst/>
+          </a:prstGeom>
+          <a:ln>
+            <a:solidFill>
+              <a:schemeClr val="bg1"/>
+            </a:solidFill>
+            <a:tailEnd type="triangle"/>
+          </a:ln>
+        </p:spPr>
+        <p:style>
+          <a:lnRef idx="1">
+            <a:schemeClr val="accent1"/>
+          </a:lnRef>
+          <a:fillRef idx="0">
+            <a:schemeClr val="accent1"/>
+          </a:fillRef>
+          <a:effectRef idx="0">
+            <a:schemeClr val="accent1"/>
+          </a:effectRef>
+          <a:fontRef idx="minor">
+            <a:schemeClr val="tx1"/>
+          </a:fontRef>
+        </p:style>
+      </p:cxnSp>
     </p:spTree>
     <p:extLst>
       <p:ext uri="{BB962C8B-B14F-4D97-AF65-F5344CB8AC3E}">

</xml_diff>

<commit_message>
Blog: Updated image in homomorphism illustrated
</commit_message>
<xml_diff>
--- a/assets/posts/2022-12-15-homomorphism-illustrated/canvas.pptx
+++ b/assets/posts/2022-12-15-homomorphism-illustrated/canvas.pptx
@@ -231,7 +231,7 @@
           <a:p>
             <a:fld id="{15F118F1-182E-490B-9E94-83767F72AB09}" type="datetimeFigureOut">
               <a:rPr lang="en-SG" smtClean="0"/>
-              <a:t>22/12/2022</a:t>
+              <a:t>18/1/2023</a:t>
             </a:fld>
             <a:endParaRPr lang="en-SG"/>
           </a:p>
@@ -401,7 +401,7 @@
           <a:p>
             <a:fld id="{15F118F1-182E-490B-9E94-83767F72AB09}" type="datetimeFigureOut">
               <a:rPr lang="en-SG" smtClean="0"/>
-              <a:t>22/12/2022</a:t>
+              <a:t>18/1/2023</a:t>
             </a:fld>
             <a:endParaRPr lang="en-SG"/>
           </a:p>
@@ -657,7 +657,7 @@
           <a:p>
             <a:fld id="{15F118F1-182E-490B-9E94-83767F72AB09}" type="datetimeFigureOut">
               <a:rPr lang="en-SG" smtClean="0"/>
-              <a:t>22/12/2022</a:t>
+              <a:t>18/1/2023</a:t>
             </a:fld>
             <a:endParaRPr lang="en-SG"/>
           </a:p>
@@ -827,7 +827,7 @@
           <a:p>
             <a:fld id="{15F118F1-182E-490B-9E94-83767F72AB09}" type="datetimeFigureOut">
               <a:rPr lang="en-SG" smtClean="0"/>
-              <a:t>22/12/2022</a:t>
+              <a:t>18/1/2023</a:t>
             </a:fld>
             <a:endParaRPr lang="en-SG"/>
           </a:p>
@@ -1170,7 +1170,7 @@
           <a:p>
             <a:fld id="{15F118F1-182E-490B-9E94-83767F72AB09}" type="datetimeFigureOut">
               <a:rPr lang="en-SG" smtClean="0"/>
-              <a:t>22/12/2022</a:t>
+              <a:t>18/1/2023</a:t>
             </a:fld>
             <a:endParaRPr lang="en-SG"/>
           </a:p>
@@ -1445,7 +1445,7 @@
           <a:p>
             <a:fld id="{15F118F1-182E-490B-9E94-83767F72AB09}" type="datetimeFigureOut">
               <a:rPr lang="en-SG" smtClean="0"/>
-              <a:t>22/12/2022</a:t>
+              <a:t>18/1/2023</a:t>
             </a:fld>
             <a:endParaRPr lang="en-SG"/>
           </a:p>
@@ -1824,7 +1824,7 @@
           <a:p>
             <a:fld id="{15F118F1-182E-490B-9E94-83767F72AB09}" type="datetimeFigureOut">
               <a:rPr lang="en-SG" smtClean="0"/>
-              <a:t>22/12/2022</a:t>
+              <a:t>18/1/2023</a:t>
             </a:fld>
             <a:endParaRPr lang="en-SG"/>
           </a:p>
@@ -1942,7 +1942,7 @@
           <a:p>
             <a:fld id="{15F118F1-182E-490B-9E94-83767F72AB09}" type="datetimeFigureOut">
               <a:rPr lang="en-SG" smtClean="0"/>
-              <a:t>22/12/2022</a:t>
+              <a:t>18/1/2023</a:t>
             </a:fld>
             <a:endParaRPr lang="en-SG"/>
           </a:p>
@@ -2113,7 +2113,7 @@
           <a:p>
             <a:fld id="{15F118F1-182E-490B-9E94-83767F72AB09}" type="datetimeFigureOut">
               <a:rPr lang="en-SG" smtClean="0"/>
-              <a:t>22/12/2022</a:t>
+              <a:t>18/1/2023</a:t>
             </a:fld>
             <a:endParaRPr lang="en-SG"/>
           </a:p>
@@ -2467,7 +2467,7 @@
           <a:p>
             <a:fld id="{15F118F1-182E-490B-9E94-83767F72AB09}" type="datetimeFigureOut">
               <a:rPr lang="en-SG" smtClean="0"/>
-              <a:t>22/12/2022</a:t>
+              <a:t>18/1/2023</a:t>
             </a:fld>
             <a:endParaRPr lang="en-SG"/>
           </a:p>
@@ -2844,7 +2844,7 @@
           <a:p>
             <a:fld id="{15F118F1-182E-490B-9E94-83767F72AB09}" type="datetimeFigureOut">
               <a:rPr lang="en-SG" smtClean="0"/>
-              <a:t>22/12/2022</a:t>
+              <a:t>18/1/2023</a:t>
             </a:fld>
             <a:endParaRPr lang="en-SG"/>
           </a:p>
@@ -3131,7 +3131,7 @@
           <a:p>
             <a:fld id="{15F118F1-182E-490B-9E94-83767F72AB09}" type="datetimeFigureOut">
               <a:rPr lang="en-SG" smtClean="0"/>
-              <a:t>22/12/2022</a:t>
+              <a:t>18/1/2023</a:t>
             </a:fld>
             <a:endParaRPr lang="en-SG"/>
           </a:p>
@@ -7811,6 +7811,2132 @@
           </p:spPr>
         </p:pic>
       </p:grpSp>
+      <p:grpSp>
+        <p:nvGrpSpPr>
+          <p:cNvPr id="1275" name="Group 1274">
+            <a:extLst>
+              <a:ext uri="{FF2B5EF4-FFF2-40B4-BE49-F238E27FC236}">
+                <a16:creationId xmlns:a16="http://schemas.microsoft.com/office/drawing/2014/main" id="{63D6B495-CB9B-4F6F-C5CD-DC951F7436B8}"/>
+              </a:ext>
+            </a:extLst>
+          </p:cNvPr>
+          <p:cNvGrpSpPr/>
+          <p:nvPr/>
+        </p:nvGrpSpPr>
+        <p:grpSpPr>
+          <a:xfrm>
+            <a:off x="5886058" y="2861143"/>
+            <a:ext cx="6074105" cy="3226078"/>
+            <a:chOff x="5779509" y="2695779"/>
+            <a:chExt cx="6074105" cy="3226078"/>
+          </a:xfrm>
+        </p:grpSpPr>
+        <p:sp>
+          <p:nvSpPr>
+            <p:cNvPr id="31" name="Oval 30">
+              <a:extLst>
+                <a:ext uri="{FF2B5EF4-FFF2-40B4-BE49-F238E27FC236}">
+                  <a16:creationId xmlns:a16="http://schemas.microsoft.com/office/drawing/2014/main" id="{F974EA18-36FA-23F9-2314-5DC4C74D7491}"/>
+                </a:ext>
+              </a:extLst>
+            </p:cNvPr>
+            <p:cNvSpPr>
+              <a:spLocks noChangeAspect="1"/>
+            </p:cNvSpPr>
+            <p:nvPr/>
+          </p:nvSpPr>
+          <p:spPr>
+            <a:xfrm>
+              <a:off x="6214022" y="4387943"/>
+              <a:ext cx="1533327" cy="1533914"/>
+            </a:xfrm>
+            <a:prstGeom prst="ellipse">
+              <a:avLst/>
+            </a:prstGeom>
+            <a:noFill/>
+            <a:ln>
+              <a:solidFill>
+                <a:schemeClr val="bg1">
+                  <a:lumMod val="65000"/>
+                </a:schemeClr>
+              </a:solidFill>
+              <a:prstDash val="dash"/>
+            </a:ln>
+          </p:spPr>
+          <p:style>
+            <a:lnRef idx="2">
+              <a:schemeClr val="accent1">
+                <a:shade val="50000"/>
+              </a:schemeClr>
+            </a:lnRef>
+            <a:fillRef idx="1">
+              <a:schemeClr val="accent1"/>
+            </a:fillRef>
+            <a:effectRef idx="0">
+              <a:schemeClr val="accent1"/>
+            </a:effectRef>
+            <a:fontRef idx="minor">
+              <a:schemeClr val="lt1"/>
+            </a:fontRef>
+          </p:style>
+          <p:txBody>
+            <a:bodyPr rtlCol="0" anchor="ctr"/>
+            <a:lstStyle/>
+            <a:p>
+              <a:pPr algn="ctr"/>
+              <a:endParaRPr lang="en-SG"/>
+            </a:p>
+          </p:txBody>
+        </p:sp>
+        <p:sp>
+          <p:nvSpPr>
+            <p:cNvPr id="28" name="Oval 27">
+              <a:extLst>
+                <a:ext uri="{FF2B5EF4-FFF2-40B4-BE49-F238E27FC236}">
+                  <a16:creationId xmlns:a16="http://schemas.microsoft.com/office/drawing/2014/main" id="{FBF375B8-4522-73C5-972F-D55803DB9DF2}"/>
+                </a:ext>
+              </a:extLst>
+            </p:cNvPr>
+            <p:cNvSpPr>
+              <a:spLocks noChangeAspect="1"/>
+            </p:cNvSpPr>
+            <p:nvPr/>
+          </p:nvSpPr>
+          <p:spPr>
+            <a:xfrm>
+              <a:off x="6214022" y="2695779"/>
+              <a:ext cx="1533327" cy="1533914"/>
+            </a:xfrm>
+            <a:prstGeom prst="ellipse">
+              <a:avLst/>
+            </a:prstGeom>
+            <a:noFill/>
+            <a:ln>
+              <a:solidFill>
+                <a:schemeClr val="bg1">
+                  <a:lumMod val="65000"/>
+                </a:schemeClr>
+              </a:solidFill>
+              <a:prstDash val="dash"/>
+            </a:ln>
+          </p:spPr>
+          <p:style>
+            <a:lnRef idx="2">
+              <a:schemeClr val="accent1">
+                <a:shade val="50000"/>
+              </a:schemeClr>
+            </a:lnRef>
+            <a:fillRef idx="1">
+              <a:schemeClr val="accent1"/>
+            </a:fillRef>
+            <a:effectRef idx="0">
+              <a:schemeClr val="accent1"/>
+            </a:effectRef>
+            <a:fontRef idx="minor">
+              <a:schemeClr val="lt1"/>
+            </a:fontRef>
+          </p:style>
+          <p:txBody>
+            <a:bodyPr rtlCol="0" anchor="ctr"/>
+            <a:lstStyle/>
+            <a:p>
+              <a:pPr algn="ctr"/>
+              <a:endParaRPr lang="en-SG"/>
+            </a:p>
+          </p:txBody>
+        </p:sp>
+        <p:sp>
+          <p:nvSpPr>
+            <p:cNvPr id="5" name="TextBox 4">
+              <a:extLst>
+                <a:ext uri="{FF2B5EF4-FFF2-40B4-BE49-F238E27FC236}">
+                  <a16:creationId xmlns:a16="http://schemas.microsoft.com/office/drawing/2014/main" id="{B55E0EE9-4F21-418B-2F61-18A58DE3289B}"/>
+                </a:ext>
+              </a:extLst>
+            </p:cNvPr>
+            <p:cNvSpPr txBox="1"/>
+            <p:nvPr/>
+          </p:nvSpPr>
+          <p:spPr>
+            <a:xfrm>
+              <a:off x="6676756" y="2791934"/>
+              <a:ext cx="607859" cy="338554"/>
+            </a:xfrm>
+            <a:prstGeom prst="rect">
+              <a:avLst/>
+            </a:prstGeom>
+            <a:noFill/>
+          </p:spPr>
+          <p:txBody>
+            <a:bodyPr wrap="none" rtlCol="0">
+              <a:spAutoFit/>
+            </a:bodyPr>
+            <a:lstStyle/>
+            <a:p>
+              <a:r>
+                <a:rPr lang="en-SG" sz="1600">
+                  <a:latin typeface="LM Roman 10" panose="00000500000000000000" pitchFamily="50" charset="0"/>
+                  <a:ea typeface="CMU Serif Upright Italic" panose="02000603000000000000" pitchFamily="2" charset="0"/>
+                  <a:cs typeface="CMU Serif Upright Italic" panose="02000603000000000000" pitchFamily="2" charset="0"/>
+                </a:rPr>
+                <a:t>(0,0)</a:t>
+              </a:r>
+            </a:p>
+          </p:txBody>
+        </p:sp>
+        <p:sp>
+          <p:nvSpPr>
+            <p:cNvPr id="6" name="TextBox 5">
+              <a:extLst>
+                <a:ext uri="{FF2B5EF4-FFF2-40B4-BE49-F238E27FC236}">
+                  <a16:creationId xmlns:a16="http://schemas.microsoft.com/office/drawing/2014/main" id="{63160DB1-71A5-0BE6-127C-C99831D73E6E}"/>
+                </a:ext>
+              </a:extLst>
+            </p:cNvPr>
+            <p:cNvSpPr txBox="1"/>
+            <p:nvPr/>
+          </p:nvSpPr>
+          <p:spPr>
+            <a:xfrm>
+              <a:off x="7131458" y="3497407"/>
+              <a:ext cx="607859" cy="338554"/>
+            </a:xfrm>
+            <a:prstGeom prst="rect">
+              <a:avLst/>
+            </a:prstGeom>
+            <a:noFill/>
+          </p:spPr>
+          <p:txBody>
+            <a:bodyPr wrap="none" rtlCol="0">
+              <a:spAutoFit/>
+            </a:bodyPr>
+            <a:lstStyle/>
+            <a:p>
+              <a:r>
+                <a:rPr lang="en-SG" sz="1600">
+                  <a:latin typeface="LM Roman 10" panose="00000500000000000000" pitchFamily="50" charset="0"/>
+                  <a:ea typeface="CMU Serif Upright Italic" panose="02000603000000000000" pitchFamily="2" charset="0"/>
+                  <a:cs typeface="CMU Serif Upright Italic" panose="02000603000000000000" pitchFamily="2" charset="0"/>
+                </a:rPr>
+                <a:t>(0,1)</a:t>
+              </a:r>
+            </a:p>
+          </p:txBody>
+        </p:sp>
+        <p:sp>
+          <p:nvSpPr>
+            <p:cNvPr id="7" name="TextBox 6">
+              <a:extLst>
+                <a:ext uri="{FF2B5EF4-FFF2-40B4-BE49-F238E27FC236}">
+                  <a16:creationId xmlns:a16="http://schemas.microsoft.com/office/drawing/2014/main" id="{3247DAE5-A98A-40E7-694D-4353B48B5D19}"/>
+                </a:ext>
+              </a:extLst>
+            </p:cNvPr>
+            <p:cNvSpPr txBox="1"/>
+            <p:nvPr/>
+          </p:nvSpPr>
+          <p:spPr>
+            <a:xfrm>
+              <a:off x="6253030" y="3497407"/>
+              <a:ext cx="607859" cy="338554"/>
+            </a:xfrm>
+            <a:prstGeom prst="rect">
+              <a:avLst/>
+            </a:prstGeom>
+            <a:noFill/>
+          </p:spPr>
+          <p:txBody>
+            <a:bodyPr wrap="none" rtlCol="0">
+              <a:spAutoFit/>
+            </a:bodyPr>
+            <a:lstStyle/>
+            <a:p>
+              <a:r>
+                <a:rPr lang="en-SG" sz="1600">
+                  <a:latin typeface="LM Roman 10" panose="00000500000000000000" pitchFamily="50" charset="0"/>
+                  <a:ea typeface="CMU Serif Upright Italic" panose="02000603000000000000" pitchFamily="2" charset="0"/>
+                  <a:cs typeface="CMU Serif Upright Italic" panose="02000603000000000000" pitchFamily="2" charset="0"/>
+                </a:rPr>
+                <a:t>(0,2)</a:t>
+              </a:r>
+            </a:p>
+          </p:txBody>
+        </p:sp>
+        <p:sp>
+          <p:nvSpPr>
+            <p:cNvPr id="12" name="Oval 11">
+              <a:extLst>
+                <a:ext uri="{FF2B5EF4-FFF2-40B4-BE49-F238E27FC236}">
+                  <a16:creationId xmlns:a16="http://schemas.microsoft.com/office/drawing/2014/main" id="{E3246238-3C18-A9C8-63B0-F67DFA07D8F4}"/>
+                </a:ext>
+              </a:extLst>
+            </p:cNvPr>
+            <p:cNvSpPr>
+              <a:spLocks noChangeAspect="1"/>
+            </p:cNvSpPr>
+            <p:nvPr/>
+          </p:nvSpPr>
+          <p:spPr>
+            <a:xfrm rot="900000">
+              <a:off x="7137923" y="3056957"/>
+              <a:ext cx="449081" cy="448380"/>
+            </a:xfrm>
+            <a:custGeom>
+              <a:avLst/>
+              <a:gdLst>
+                <a:gd name="connsiteX0" fmla="*/ 0 w 643171"/>
+                <a:gd name="connsiteY0" fmla="*/ 321084 h 642168"/>
+                <a:gd name="connsiteX1" fmla="*/ 321586 w 643171"/>
+                <a:gd name="connsiteY1" fmla="*/ 0 h 642168"/>
+                <a:gd name="connsiteX2" fmla="*/ 643172 w 643171"/>
+                <a:gd name="connsiteY2" fmla="*/ 321084 h 642168"/>
+                <a:gd name="connsiteX3" fmla="*/ 321586 w 643171"/>
+                <a:gd name="connsiteY3" fmla="*/ 642168 h 642168"/>
+                <a:gd name="connsiteX4" fmla="*/ 0 w 643171"/>
+                <a:gd name="connsiteY4" fmla="*/ 321084 h 642168"/>
+                <a:gd name="connsiteX0" fmla="*/ 0 w 643172"/>
+                <a:gd name="connsiteY0" fmla="*/ 321084 h 642168"/>
+                <a:gd name="connsiteX1" fmla="*/ 321586 w 643172"/>
+                <a:gd name="connsiteY1" fmla="*/ 0 h 642168"/>
+                <a:gd name="connsiteX2" fmla="*/ 643172 w 643172"/>
+                <a:gd name="connsiteY2" fmla="*/ 321084 h 642168"/>
+                <a:gd name="connsiteX3" fmla="*/ 321586 w 643172"/>
+                <a:gd name="connsiteY3" fmla="*/ 642168 h 642168"/>
+                <a:gd name="connsiteX4" fmla="*/ 91440 w 643172"/>
+                <a:gd name="connsiteY4" fmla="*/ 412524 h 642168"/>
+                <a:gd name="connsiteX0" fmla="*/ 258485 w 580071"/>
+                <a:gd name="connsiteY0" fmla="*/ 0 h 642168"/>
+                <a:gd name="connsiteX1" fmla="*/ 580071 w 580071"/>
+                <a:gd name="connsiteY1" fmla="*/ 321084 h 642168"/>
+                <a:gd name="connsiteX2" fmla="*/ 258485 w 580071"/>
+                <a:gd name="connsiteY2" fmla="*/ 642168 h 642168"/>
+                <a:gd name="connsiteX3" fmla="*/ 28339 w 580071"/>
+                <a:gd name="connsiteY3" fmla="*/ 412524 h 642168"/>
+                <a:gd name="connsiteX0" fmla="*/ 0 w 321586"/>
+                <a:gd name="connsiteY0" fmla="*/ 0 h 642168"/>
+                <a:gd name="connsiteX1" fmla="*/ 321586 w 321586"/>
+                <a:gd name="connsiteY1" fmla="*/ 321084 h 642168"/>
+                <a:gd name="connsiteX2" fmla="*/ 0 w 321586"/>
+                <a:gd name="connsiteY2" fmla="*/ 642168 h 642168"/>
+                <a:gd name="connsiteX0" fmla="*/ 0 w 321586"/>
+                <a:gd name="connsiteY0" fmla="*/ 0 h 321084"/>
+                <a:gd name="connsiteX1" fmla="*/ 321586 w 321586"/>
+                <a:gd name="connsiteY1" fmla="*/ 321084 h 321084"/>
+              </a:gdLst>
+              <a:ahLst/>
+              <a:cxnLst>
+                <a:cxn ang="0">
+                  <a:pos x="connsiteX0" y="connsiteY0"/>
+                </a:cxn>
+                <a:cxn ang="0">
+                  <a:pos x="connsiteX1" y="connsiteY1"/>
+                </a:cxn>
+              </a:cxnLst>
+              <a:rect l="l" t="t" r="r" b="b"/>
+              <a:pathLst>
+                <a:path w="321586" h="321084">
+                  <a:moveTo>
+                    <a:pt x="0" y="0"/>
+                  </a:moveTo>
+                  <a:cubicBezTo>
+                    <a:pt x="177607" y="0"/>
+                    <a:pt x="321586" y="143754"/>
+                    <a:pt x="321586" y="321084"/>
+                  </a:cubicBezTo>
+                </a:path>
+              </a:pathLst>
+            </a:custGeom>
+            <a:noFill/>
+            <a:ln>
+              <a:solidFill>
+                <a:schemeClr val="accent6">
+                  <a:lumMod val="75000"/>
+                </a:schemeClr>
+              </a:solidFill>
+              <a:tailEnd type="triangle"/>
+            </a:ln>
+          </p:spPr>
+          <p:style>
+            <a:lnRef idx="2">
+              <a:schemeClr val="accent1">
+                <a:shade val="50000"/>
+              </a:schemeClr>
+            </a:lnRef>
+            <a:fillRef idx="1">
+              <a:schemeClr val="accent1"/>
+            </a:fillRef>
+            <a:effectRef idx="0">
+              <a:schemeClr val="accent1"/>
+            </a:effectRef>
+            <a:fontRef idx="minor">
+              <a:schemeClr val="lt1"/>
+            </a:fontRef>
+          </p:style>
+          <p:txBody>
+            <a:bodyPr rtlCol="0" anchor="ctr"/>
+            <a:lstStyle/>
+            <a:p>
+              <a:pPr algn="ctr"/>
+              <a:endParaRPr lang="en-SG"/>
+            </a:p>
+          </p:txBody>
+        </p:sp>
+        <p:sp>
+          <p:nvSpPr>
+            <p:cNvPr id="15" name="Oval 11">
+              <a:extLst>
+                <a:ext uri="{FF2B5EF4-FFF2-40B4-BE49-F238E27FC236}">
+                  <a16:creationId xmlns:a16="http://schemas.microsoft.com/office/drawing/2014/main" id="{3B12CAE9-4D3E-9735-ADEF-9BD68B756373}"/>
+                </a:ext>
+              </a:extLst>
+            </p:cNvPr>
+            <p:cNvSpPr>
+              <a:spLocks noChangeAspect="1"/>
+            </p:cNvSpPr>
+            <p:nvPr/>
+          </p:nvSpPr>
+          <p:spPr>
+            <a:xfrm rot="8100000">
+              <a:off x="6761909" y="3615577"/>
+              <a:ext cx="449081" cy="448380"/>
+            </a:xfrm>
+            <a:custGeom>
+              <a:avLst/>
+              <a:gdLst>
+                <a:gd name="connsiteX0" fmla="*/ 0 w 643171"/>
+                <a:gd name="connsiteY0" fmla="*/ 321084 h 642168"/>
+                <a:gd name="connsiteX1" fmla="*/ 321586 w 643171"/>
+                <a:gd name="connsiteY1" fmla="*/ 0 h 642168"/>
+                <a:gd name="connsiteX2" fmla="*/ 643172 w 643171"/>
+                <a:gd name="connsiteY2" fmla="*/ 321084 h 642168"/>
+                <a:gd name="connsiteX3" fmla="*/ 321586 w 643171"/>
+                <a:gd name="connsiteY3" fmla="*/ 642168 h 642168"/>
+                <a:gd name="connsiteX4" fmla="*/ 0 w 643171"/>
+                <a:gd name="connsiteY4" fmla="*/ 321084 h 642168"/>
+                <a:gd name="connsiteX0" fmla="*/ 0 w 643172"/>
+                <a:gd name="connsiteY0" fmla="*/ 321084 h 642168"/>
+                <a:gd name="connsiteX1" fmla="*/ 321586 w 643172"/>
+                <a:gd name="connsiteY1" fmla="*/ 0 h 642168"/>
+                <a:gd name="connsiteX2" fmla="*/ 643172 w 643172"/>
+                <a:gd name="connsiteY2" fmla="*/ 321084 h 642168"/>
+                <a:gd name="connsiteX3" fmla="*/ 321586 w 643172"/>
+                <a:gd name="connsiteY3" fmla="*/ 642168 h 642168"/>
+                <a:gd name="connsiteX4" fmla="*/ 91440 w 643172"/>
+                <a:gd name="connsiteY4" fmla="*/ 412524 h 642168"/>
+                <a:gd name="connsiteX0" fmla="*/ 258485 w 580071"/>
+                <a:gd name="connsiteY0" fmla="*/ 0 h 642168"/>
+                <a:gd name="connsiteX1" fmla="*/ 580071 w 580071"/>
+                <a:gd name="connsiteY1" fmla="*/ 321084 h 642168"/>
+                <a:gd name="connsiteX2" fmla="*/ 258485 w 580071"/>
+                <a:gd name="connsiteY2" fmla="*/ 642168 h 642168"/>
+                <a:gd name="connsiteX3" fmla="*/ 28339 w 580071"/>
+                <a:gd name="connsiteY3" fmla="*/ 412524 h 642168"/>
+                <a:gd name="connsiteX0" fmla="*/ 0 w 321586"/>
+                <a:gd name="connsiteY0" fmla="*/ 0 h 642168"/>
+                <a:gd name="connsiteX1" fmla="*/ 321586 w 321586"/>
+                <a:gd name="connsiteY1" fmla="*/ 321084 h 642168"/>
+                <a:gd name="connsiteX2" fmla="*/ 0 w 321586"/>
+                <a:gd name="connsiteY2" fmla="*/ 642168 h 642168"/>
+                <a:gd name="connsiteX0" fmla="*/ 0 w 321586"/>
+                <a:gd name="connsiteY0" fmla="*/ 0 h 321084"/>
+                <a:gd name="connsiteX1" fmla="*/ 321586 w 321586"/>
+                <a:gd name="connsiteY1" fmla="*/ 321084 h 321084"/>
+              </a:gdLst>
+              <a:ahLst/>
+              <a:cxnLst>
+                <a:cxn ang="0">
+                  <a:pos x="connsiteX0" y="connsiteY0"/>
+                </a:cxn>
+                <a:cxn ang="0">
+                  <a:pos x="connsiteX1" y="connsiteY1"/>
+                </a:cxn>
+              </a:cxnLst>
+              <a:rect l="l" t="t" r="r" b="b"/>
+              <a:pathLst>
+                <a:path w="321586" h="321084">
+                  <a:moveTo>
+                    <a:pt x="0" y="0"/>
+                  </a:moveTo>
+                  <a:cubicBezTo>
+                    <a:pt x="177607" y="0"/>
+                    <a:pt x="321586" y="143754"/>
+                    <a:pt x="321586" y="321084"/>
+                  </a:cubicBezTo>
+                </a:path>
+              </a:pathLst>
+            </a:custGeom>
+            <a:noFill/>
+            <a:ln>
+              <a:solidFill>
+                <a:schemeClr val="accent6">
+                  <a:lumMod val="75000"/>
+                </a:schemeClr>
+              </a:solidFill>
+              <a:tailEnd type="triangle"/>
+            </a:ln>
+          </p:spPr>
+          <p:style>
+            <a:lnRef idx="2">
+              <a:schemeClr val="accent1">
+                <a:shade val="50000"/>
+              </a:schemeClr>
+            </a:lnRef>
+            <a:fillRef idx="1">
+              <a:schemeClr val="accent1"/>
+            </a:fillRef>
+            <a:effectRef idx="0">
+              <a:schemeClr val="accent1"/>
+            </a:effectRef>
+            <a:fontRef idx="minor">
+              <a:schemeClr val="lt1"/>
+            </a:fontRef>
+          </p:style>
+          <p:txBody>
+            <a:bodyPr rtlCol="0" anchor="ctr"/>
+            <a:lstStyle/>
+            <a:p>
+              <a:pPr algn="ctr"/>
+              <a:endParaRPr lang="en-SG"/>
+            </a:p>
+          </p:txBody>
+        </p:sp>
+        <p:sp>
+          <p:nvSpPr>
+            <p:cNvPr id="16" name="Oval 11">
+              <a:extLst>
+                <a:ext uri="{FF2B5EF4-FFF2-40B4-BE49-F238E27FC236}">
+                  <a16:creationId xmlns:a16="http://schemas.microsoft.com/office/drawing/2014/main" id="{E1DEA1A6-DB94-EEBF-BC65-A54216F39549}"/>
+                </a:ext>
+              </a:extLst>
+            </p:cNvPr>
+            <p:cNvSpPr>
+              <a:spLocks noChangeAspect="1"/>
+            </p:cNvSpPr>
+            <p:nvPr/>
+          </p:nvSpPr>
+          <p:spPr>
+            <a:xfrm rot="15300000">
+              <a:off x="6381019" y="3068832"/>
+              <a:ext cx="449081" cy="448380"/>
+            </a:xfrm>
+            <a:custGeom>
+              <a:avLst/>
+              <a:gdLst>
+                <a:gd name="connsiteX0" fmla="*/ 0 w 643171"/>
+                <a:gd name="connsiteY0" fmla="*/ 321084 h 642168"/>
+                <a:gd name="connsiteX1" fmla="*/ 321586 w 643171"/>
+                <a:gd name="connsiteY1" fmla="*/ 0 h 642168"/>
+                <a:gd name="connsiteX2" fmla="*/ 643172 w 643171"/>
+                <a:gd name="connsiteY2" fmla="*/ 321084 h 642168"/>
+                <a:gd name="connsiteX3" fmla="*/ 321586 w 643171"/>
+                <a:gd name="connsiteY3" fmla="*/ 642168 h 642168"/>
+                <a:gd name="connsiteX4" fmla="*/ 0 w 643171"/>
+                <a:gd name="connsiteY4" fmla="*/ 321084 h 642168"/>
+                <a:gd name="connsiteX0" fmla="*/ 0 w 643172"/>
+                <a:gd name="connsiteY0" fmla="*/ 321084 h 642168"/>
+                <a:gd name="connsiteX1" fmla="*/ 321586 w 643172"/>
+                <a:gd name="connsiteY1" fmla="*/ 0 h 642168"/>
+                <a:gd name="connsiteX2" fmla="*/ 643172 w 643172"/>
+                <a:gd name="connsiteY2" fmla="*/ 321084 h 642168"/>
+                <a:gd name="connsiteX3" fmla="*/ 321586 w 643172"/>
+                <a:gd name="connsiteY3" fmla="*/ 642168 h 642168"/>
+                <a:gd name="connsiteX4" fmla="*/ 91440 w 643172"/>
+                <a:gd name="connsiteY4" fmla="*/ 412524 h 642168"/>
+                <a:gd name="connsiteX0" fmla="*/ 258485 w 580071"/>
+                <a:gd name="connsiteY0" fmla="*/ 0 h 642168"/>
+                <a:gd name="connsiteX1" fmla="*/ 580071 w 580071"/>
+                <a:gd name="connsiteY1" fmla="*/ 321084 h 642168"/>
+                <a:gd name="connsiteX2" fmla="*/ 258485 w 580071"/>
+                <a:gd name="connsiteY2" fmla="*/ 642168 h 642168"/>
+                <a:gd name="connsiteX3" fmla="*/ 28339 w 580071"/>
+                <a:gd name="connsiteY3" fmla="*/ 412524 h 642168"/>
+                <a:gd name="connsiteX0" fmla="*/ 0 w 321586"/>
+                <a:gd name="connsiteY0" fmla="*/ 0 h 642168"/>
+                <a:gd name="connsiteX1" fmla="*/ 321586 w 321586"/>
+                <a:gd name="connsiteY1" fmla="*/ 321084 h 642168"/>
+                <a:gd name="connsiteX2" fmla="*/ 0 w 321586"/>
+                <a:gd name="connsiteY2" fmla="*/ 642168 h 642168"/>
+                <a:gd name="connsiteX0" fmla="*/ 0 w 321586"/>
+                <a:gd name="connsiteY0" fmla="*/ 0 h 321084"/>
+                <a:gd name="connsiteX1" fmla="*/ 321586 w 321586"/>
+                <a:gd name="connsiteY1" fmla="*/ 321084 h 321084"/>
+              </a:gdLst>
+              <a:ahLst/>
+              <a:cxnLst>
+                <a:cxn ang="0">
+                  <a:pos x="connsiteX0" y="connsiteY0"/>
+                </a:cxn>
+                <a:cxn ang="0">
+                  <a:pos x="connsiteX1" y="connsiteY1"/>
+                </a:cxn>
+              </a:cxnLst>
+              <a:rect l="l" t="t" r="r" b="b"/>
+              <a:pathLst>
+                <a:path w="321586" h="321084">
+                  <a:moveTo>
+                    <a:pt x="0" y="0"/>
+                  </a:moveTo>
+                  <a:cubicBezTo>
+                    <a:pt x="177607" y="0"/>
+                    <a:pt x="321586" y="143754"/>
+                    <a:pt x="321586" y="321084"/>
+                  </a:cubicBezTo>
+                </a:path>
+              </a:pathLst>
+            </a:custGeom>
+            <a:noFill/>
+            <a:ln>
+              <a:solidFill>
+                <a:schemeClr val="accent6">
+                  <a:lumMod val="75000"/>
+                </a:schemeClr>
+              </a:solidFill>
+              <a:tailEnd type="triangle"/>
+            </a:ln>
+          </p:spPr>
+          <p:style>
+            <a:lnRef idx="2">
+              <a:schemeClr val="accent1">
+                <a:shade val="50000"/>
+              </a:schemeClr>
+            </a:lnRef>
+            <a:fillRef idx="1">
+              <a:schemeClr val="accent1"/>
+            </a:fillRef>
+            <a:effectRef idx="0">
+              <a:schemeClr val="accent1"/>
+            </a:effectRef>
+            <a:fontRef idx="minor">
+              <a:schemeClr val="lt1"/>
+            </a:fontRef>
+          </p:style>
+          <p:txBody>
+            <a:bodyPr rtlCol="0" anchor="ctr"/>
+            <a:lstStyle/>
+            <a:p>
+              <a:pPr algn="ctr"/>
+              <a:endParaRPr lang="en-SG"/>
+            </a:p>
+          </p:txBody>
+        </p:sp>
+        <p:sp>
+          <p:nvSpPr>
+            <p:cNvPr id="17" name="TextBox 16">
+              <a:extLst>
+                <a:ext uri="{FF2B5EF4-FFF2-40B4-BE49-F238E27FC236}">
+                  <a16:creationId xmlns:a16="http://schemas.microsoft.com/office/drawing/2014/main" id="{46910F62-4256-2442-ABBF-876773D68DB2}"/>
+                </a:ext>
+              </a:extLst>
+            </p:cNvPr>
+            <p:cNvSpPr txBox="1"/>
+            <p:nvPr/>
+          </p:nvSpPr>
+          <p:spPr>
+            <a:xfrm>
+              <a:off x="6676756" y="4495275"/>
+              <a:ext cx="607859" cy="338554"/>
+            </a:xfrm>
+            <a:prstGeom prst="rect">
+              <a:avLst/>
+            </a:prstGeom>
+            <a:noFill/>
+          </p:spPr>
+          <p:txBody>
+            <a:bodyPr wrap="none" rtlCol="0">
+              <a:spAutoFit/>
+            </a:bodyPr>
+            <a:lstStyle/>
+            <a:p>
+              <a:r>
+                <a:rPr lang="en-SG" sz="1600">
+                  <a:latin typeface="LM Roman 10" panose="00000500000000000000" pitchFamily="50" charset="0"/>
+                  <a:ea typeface="CMU Serif Upright Italic" panose="02000603000000000000" pitchFamily="2" charset="0"/>
+                  <a:cs typeface="CMU Serif Upright Italic" panose="02000603000000000000" pitchFamily="2" charset="0"/>
+                </a:rPr>
+                <a:t>(1,0)</a:t>
+              </a:r>
+            </a:p>
+          </p:txBody>
+        </p:sp>
+        <p:sp>
+          <p:nvSpPr>
+            <p:cNvPr id="19" name="TextBox 18">
+              <a:extLst>
+                <a:ext uri="{FF2B5EF4-FFF2-40B4-BE49-F238E27FC236}">
+                  <a16:creationId xmlns:a16="http://schemas.microsoft.com/office/drawing/2014/main" id="{5C55C972-91A1-98B3-77BC-ABCD718F0A78}"/>
+                </a:ext>
+              </a:extLst>
+            </p:cNvPr>
+            <p:cNvSpPr txBox="1"/>
+            <p:nvPr/>
+          </p:nvSpPr>
+          <p:spPr>
+            <a:xfrm>
+              <a:off x="6253030" y="5200748"/>
+              <a:ext cx="607859" cy="338554"/>
+            </a:xfrm>
+            <a:prstGeom prst="rect">
+              <a:avLst/>
+            </a:prstGeom>
+            <a:noFill/>
+          </p:spPr>
+          <p:txBody>
+            <a:bodyPr wrap="none" rtlCol="0">
+              <a:spAutoFit/>
+            </a:bodyPr>
+            <a:lstStyle/>
+            <a:p>
+              <a:r>
+                <a:rPr lang="en-SG" sz="1600">
+                  <a:latin typeface="LM Roman 10" panose="00000500000000000000" pitchFamily="50" charset="0"/>
+                  <a:ea typeface="CMU Serif Upright Italic" panose="02000603000000000000" pitchFamily="2" charset="0"/>
+                  <a:cs typeface="CMU Serif Upright Italic" panose="02000603000000000000" pitchFamily="2" charset="0"/>
+                </a:rPr>
+                <a:t>(1,2)</a:t>
+              </a:r>
+            </a:p>
+          </p:txBody>
+        </p:sp>
+        <p:sp>
+          <p:nvSpPr>
+            <p:cNvPr id="20" name="Oval 11">
+              <a:extLst>
+                <a:ext uri="{FF2B5EF4-FFF2-40B4-BE49-F238E27FC236}">
+                  <a16:creationId xmlns:a16="http://schemas.microsoft.com/office/drawing/2014/main" id="{3FD9CAEA-8FE7-83DC-AECD-D6C71800F2A0}"/>
+                </a:ext>
+              </a:extLst>
+            </p:cNvPr>
+            <p:cNvSpPr>
+              <a:spLocks noChangeAspect="1"/>
+            </p:cNvSpPr>
+            <p:nvPr/>
+          </p:nvSpPr>
+          <p:spPr>
+            <a:xfrm rot="900000">
+              <a:off x="7137923" y="4760298"/>
+              <a:ext cx="449081" cy="448380"/>
+            </a:xfrm>
+            <a:custGeom>
+              <a:avLst/>
+              <a:gdLst>
+                <a:gd name="connsiteX0" fmla="*/ 0 w 643171"/>
+                <a:gd name="connsiteY0" fmla="*/ 321084 h 642168"/>
+                <a:gd name="connsiteX1" fmla="*/ 321586 w 643171"/>
+                <a:gd name="connsiteY1" fmla="*/ 0 h 642168"/>
+                <a:gd name="connsiteX2" fmla="*/ 643172 w 643171"/>
+                <a:gd name="connsiteY2" fmla="*/ 321084 h 642168"/>
+                <a:gd name="connsiteX3" fmla="*/ 321586 w 643171"/>
+                <a:gd name="connsiteY3" fmla="*/ 642168 h 642168"/>
+                <a:gd name="connsiteX4" fmla="*/ 0 w 643171"/>
+                <a:gd name="connsiteY4" fmla="*/ 321084 h 642168"/>
+                <a:gd name="connsiteX0" fmla="*/ 0 w 643172"/>
+                <a:gd name="connsiteY0" fmla="*/ 321084 h 642168"/>
+                <a:gd name="connsiteX1" fmla="*/ 321586 w 643172"/>
+                <a:gd name="connsiteY1" fmla="*/ 0 h 642168"/>
+                <a:gd name="connsiteX2" fmla="*/ 643172 w 643172"/>
+                <a:gd name="connsiteY2" fmla="*/ 321084 h 642168"/>
+                <a:gd name="connsiteX3" fmla="*/ 321586 w 643172"/>
+                <a:gd name="connsiteY3" fmla="*/ 642168 h 642168"/>
+                <a:gd name="connsiteX4" fmla="*/ 91440 w 643172"/>
+                <a:gd name="connsiteY4" fmla="*/ 412524 h 642168"/>
+                <a:gd name="connsiteX0" fmla="*/ 258485 w 580071"/>
+                <a:gd name="connsiteY0" fmla="*/ 0 h 642168"/>
+                <a:gd name="connsiteX1" fmla="*/ 580071 w 580071"/>
+                <a:gd name="connsiteY1" fmla="*/ 321084 h 642168"/>
+                <a:gd name="connsiteX2" fmla="*/ 258485 w 580071"/>
+                <a:gd name="connsiteY2" fmla="*/ 642168 h 642168"/>
+                <a:gd name="connsiteX3" fmla="*/ 28339 w 580071"/>
+                <a:gd name="connsiteY3" fmla="*/ 412524 h 642168"/>
+                <a:gd name="connsiteX0" fmla="*/ 0 w 321586"/>
+                <a:gd name="connsiteY0" fmla="*/ 0 h 642168"/>
+                <a:gd name="connsiteX1" fmla="*/ 321586 w 321586"/>
+                <a:gd name="connsiteY1" fmla="*/ 321084 h 642168"/>
+                <a:gd name="connsiteX2" fmla="*/ 0 w 321586"/>
+                <a:gd name="connsiteY2" fmla="*/ 642168 h 642168"/>
+                <a:gd name="connsiteX0" fmla="*/ 0 w 321586"/>
+                <a:gd name="connsiteY0" fmla="*/ 0 h 321084"/>
+                <a:gd name="connsiteX1" fmla="*/ 321586 w 321586"/>
+                <a:gd name="connsiteY1" fmla="*/ 321084 h 321084"/>
+              </a:gdLst>
+              <a:ahLst/>
+              <a:cxnLst>
+                <a:cxn ang="0">
+                  <a:pos x="connsiteX0" y="connsiteY0"/>
+                </a:cxn>
+                <a:cxn ang="0">
+                  <a:pos x="connsiteX1" y="connsiteY1"/>
+                </a:cxn>
+              </a:cxnLst>
+              <a:rect l="l" t="t" r="r" b="b"/>
+              <a:pathLst>
+                <a:path w="321586" h="321084">
+                  <a:moveTo>
+                    <a:pt x="0" y="0"/>
+                  </a:moveTo>
+                  <a:cubicBezTo>
+                    <a:pt x="177607" y="0"/>
+                    <a:pt x="321586" y="143754"/>
+                    <a:pt x="321586" y="321084"/>
+                  </a:cubicBezTo>
+                </a:path>
+              </a:pathLst>
+            </a:custGeom>
+            <a:noFill/>
+            <a:ln>
+              <a:solidFill>
+                <a:schemeClr val="accent6">
+                  <a:lumMod val="75000"/>
+                </a:schemeClr>
+              </a:solidFill>
+              <a:tailEnd type="triangle"/>
+            </a:ln>
+          </p:spPr>
+          <p:style>
+            <a:lnRef idx="2">
+              <a:schemeClr val="accent1">
+                <a:shade val="50000"/>
+              </a:schemeClr>
+            </a:lnRef>
+            <a:fillRef idx="1">
+              <a:schemeClr val="accent1"/>
+            </a:fillRef>
+            <a:effectRef idx="0">
+              <a:schemeClr val="accent1"/>
+            </a:effectRef>
+            <a:fontRef idx="minor">
+              <a:schemeClr val="lt1"/>
+            </a:fontRef>
+          </p:style>
+          <p:txBody>
+            <a:bodyPr rtlCol="0" anchor="ctr"/>
+            <a:lstStyle/>
+            <a:p>
+              <a:pPr algn="ctr"/>
+              <a:endParaRPr lang="en-SG"/>
+            </a:p>
+          </p:txBody>
+        </p:sp>
+        <p:sp>
+          <p:nvSpPr>
+            <p:cNvPr id="21" name="Oval 11">
+              <a:extLst>
+                <a:ext uri="{FF2B5EF4-FFF2-40B4-BE49-F238E27FC236}">
+                  <a16:creationId xmlns:a16="http://schemas.microsoft.com/office/drawing/2014/main" id="{B0CAFAC5-8006-78A1-B6DA-14C37D359F17}"/>
+                </a:ext>
+              </a:extLst>
+            </p:cNvPr>
+            <p:cNvSpPr>
+              <a:spLocks noChangeAspect="1"/>
+            </p:cNvSpPr>
+            <p:nvPr/>
+          </p:nvSpPr>
+          <p:spPr>
+            <a:xfrm rot="8100000">
+              <a:off x="6761909" y="5318918"/>
+              <a:ext cx="449081" cy="448380"/>
+            </a:xfrm>
+            <a:custGeom>
+              <a:avLst/>
+              <a:gdLst>
+                <a:gd name="connsiteX0" fmla="*/ 0 w 643171"/>
+                <a:gd name="connsiteY0" fmla="*/ 321084 h 642168"/>
+                <a:gd name="connsiteX1" fmla="*/ 321586 w 643171"/>
+                <a:gd name="connsiteY1" fmla="*/ 0 h 642168"/>
+                <a:gd name="connsiteX2" fmla="*/ 643172 w 643171"/>
+                <a:gd name="connsiteY2" fmla="*/ 321084 h 642168"/>
+                <a:gd name="connsiteX3" fmla="*/ 321586 w 643171"/>
+                <a:gd name="connsiteY3" fmla="*/ 642168 h 642168"/>
+                <a:gd name="connsiteX4" fmla="*/ 0 w 643171"/>
+                <a:gd name="connsiteY4" fmla="*/ 321084 h 642168"/>
+                <a:gd name="connsiteX0" fmla="*/ 0 w 643172"/>
+                <a:gd name="connsiteY0" fmla="*/ 321084 h 642168"/>
+                <a:gd name="connsiteX1" fmla="*/ 321586 w 643172"/>
+                <a:gd name="connsiteY1" fmla="*/ 0 h 642168"/>
+                <a:gd name="connsiteX2" fmla="*/ 643172 w 643172"/>
+                <a:gd name="connsiteY2" fmla="*/ 321084 h 642168"/>
+                <a:gd name="connsiteX3" fmla="*/ 321586 w 643172"/>
+                <a:gd name="connsiteY3" fmla="*/ 642168 h 642168"/>
+                <a:gd name="connsiteX4" fmla="*/ 91440 w 643172"/>
+                <a:gd name="connsiteY4" fmla="*/ 412524 h 642168"/>
+                <a:gd name="connsiteX0" fmla="*/ 258485 w 580071"/>
+                <a:gd name="connsiteY0" fmla="*/ 0 h 642168"/>
+                <a:gd name="connsiteX1" fmla="*/ 580071 w 580071"/>
+                <a:gd name="connsiteY1" fmla="*/ 321084 h 642168"/>
+                <a:gd name="connsiteX2" fmla="*/ 258485 w 580071"/>
+                <a:gd name="connsiteY2" fmla="*/ 642168 h 642168"/>
+                <a:gd name="connsiteX3" fmla="*/ 28339 w 580071"/>
+                <a:gd name="connsiteY3" fmla="*/ 412524 h 642168"/>
+                <a:gd name="connsiteX0" fmla="*/ 0 w 321586"/>
+                <a:gd name="connsiteY0" fmla="*/ 0 h 642168"/>
+                <a:gd name="connsiteX1" fmla="*/ 321586 w 321586"/>
+                <a:gd name="connsiteY1" fmla="*/ 321084 h 642168"/>
+                <a:gd name="connsiteX2" fmla="*/ 0 w 321586"/>
+                <a:gd name="connsiteY2" fmla="*/ 642168 h 642168"/>
+                <a:gd name="connsiteX0" fmla="*/ 0 w 321586"/>
+                <a:gd name="connsiteY0" fmla="*/ 0 h 321084"/>
+                <a:gd name="connsiteX1" fmla="*/ 321586 w 321586"/>
+                <a:gd name="connsiteY1" fmla="*/ 321084 h 321084"/>
+              </a:gdLst>
+              <a:ahLst/>
+              <a:cxnLst>
+                <a:cxn ang="0">
+                  <a:pos x="connsiteX0" y="connsiteY0"/>
+                </a:cxn>
+                <a:cxn ang="0">
+                  <a:pos x="connsiteX1" y="connsiteY1"/>
+                </a:cxn>
+              </a:cxnLst>
+              <a:rect l="l" t="t" r="r" b="b"/>
+              <a:pathLst>
+                <a:path w="321586" h="321084">
+                  <a:moveTo>
+                    <a:pt x="0" y="0"/>
+                  </a:moveTo>
+                  <a:cubicBezTo>
+                    <a:pt x="177607" y="0"/>
+                    <a:pt x="321586" y="143754"/>
+                    <a:pt x="321586" y="321084"/>
+                  </a:cubicBezTo>
+                </a:path>
+              </a:pathLst>
+            </a:custGeom>
+            <a:noFill/>
+            <a:ln>
+              <a:solidFill>
+                <a:schemeClr val="accent6">
+                  <a:lumMod val="75000"/>
+                </a:schemeClr>
+              </a:solidFill>
+              <a:tailEnd type="triangle"/>
+            </a:ln>
+          </p:spPr>
+          <p:style>
+            <a:lnRef idx="2">
+              <a:schemeClr val="accent1">
+                <a:shade val="50000"/>
+              </a:schemeClr>
+            </a:lnRef>
+            <a:fillRef idx="1">
+              <a:schemeClr val="accent1"/>
+            </a:fillRef>
+            <a:effectRef idx="0">
+              <a:schemeClr val="accent1"/>
+            </a:effectRef>
+            <a:fontRef idx="minor">
+              <a:schemeClr val="lt1"/>
+            </a:fontRef>
+          </p:style>
+          <p:txBody>
+            <a:bodyPr rtlCol="0" anchor="ctr"/>
+            <a:lstStyle/>
+            <a:p>
+              <a:pPr algn="ctr"/>
+              <a:endParaRPr lang="en-SG"/>
+            </a:p>
+          </p:txBody>
+        </p:sp>
+        <p:sp>
+          <p:nvSpPr>
+            <p:cNvPr id="22" name="Oval 11">
+              <a:extLst>
+                <a:ext uri="{FF2B5EF4-FFF2-40B4-BE49-F238E27FC236}">
+                  <a16:creationId xmlns:a16="http://schemas.microsoft.com/office/drawing/2014/main" id="{1178B332-B81C-90E1-6895-1F5A0FC936A5}"/>
+                </a:ext>
+              </a:extLst>
+            </p:cNvPr>
+            <p:cNvSpPr>
+              <a:spLocks noChangeAspect="1"/>
+            </p:cNvSpPr>
+            <p:nvPr/>
+          </p:nvSpPr>
+          <p:spPr>
+            <a:xfrm rot="15300000">
+              <a:off x="6381019" y="4772173"/>
+              <a:ext cx="449081" cy="448380"/>
+            </a:xfrm>
+            <a:custGeom>
+              <a:avLst/>
+              <a:gdLst>
+                <a:gd name="connsiteX0" fmla="*/ 0 w 643171"/>
+                <a:gd name="connsiteY0" fmla="*/ 321084 h 642168"/>
+                <a:gd name="connsiteX1" fmla="*/ 321586 w 643171"/>
+                <a:gd name="connsiteY1" fmla="*/ 0 h 642168"/>
+                <a:gd name="connsiteX2" fmla="*/ 643172 w 643171"/>
+                <a:gd name="connsiteY2" fmla="*/ 321084 h 642168"/>
+                <a:gd name="connsiteX3" fmla="*/ 321586 w 643171"/>
+                <a:gd name="connsiteY3" fmla="*/ 642168 h 642168"/>
+                <a:gd name="connsiteX4" fmla="*/ 0 w 643171"/>
+                <a:gd name="connsiteY4" fmla="*/ 321084 h 642168"/>
+                <a:gd name="connsiteX0" fmla="*/ 0 w 643172"/>
+                <a:gd name="connsiteY0" fmla="*/ 321084 h 642168"/>
+                <a:gd name="connsiteX1" fmla="*/ 321586 w 643172"/>
+                <a:gd name="connsiteY1" fmla="*/ 0 h 642168"/>
+                <a:gd name="connsiteX2" fmla="*/ 643172 w 643172"/>
+                <a:gd name="connsiteY2" fmla="*/ 321084 h 642168"/>
+                <a:gd name="connsiteX3" fmla="*/ 321586 w 643172"/>
+                <a:gd name="connsiteY3" fmla="*/ 642168 h 642168"/>
+                <a:gd name="connsiteX4" fmla="*/ 91440 w 643172"/>
+                <a:gd name="connsiteY4" fmla="*/ 412524 h 642168"/>
+                <a:gd name="connsiteX0" fmla="*/ 258485 w 580071"/>
+                <a:gd name="connsiteY0" fmla="*/ 0 h 642168"/>
+                <a:gd name="connsiteX1" fmla="*/ 580071 w 580071"/>
+                <a:gd name="connsiteY1" fmla="*/ 321084 h 642168"/>
+                <a:gd name="connsiteX2" fmla="*/ 258485 w 580071"/>
+                <a:gd name="connsiteY2" fmla="*/ 642168 h 642168"/>
+                <a:gd name="connsiteX3" fmla="*/ 28339 w 580071"/>
+                <a:gd name="connsiteY3" fmla="*/ 412524 h 642168"/>
+                <a:gd name="connsiteX0" fmla="*/ 0 w 321586"/>
+                <a:gd name="connsiteY0" fmla="*/ 0 h 642168"/>
+                <a:gd name="connsiteX1" fmla="*/ 321586 w 321586"/>
+                <a:gd name="connsiteY1" fmla="*/ 321084 h 642168"/>
+                <a:gd name="connsiteX2" fmla="*/ 0 w 321586"/>
+                <a:gd name="connsiteY2" fmla="*/ 642168 h 642168"/>
+                <a:gd name="connsiteX0" fmla="*/ 0 w 321586"/>
+                <a:gd name="connsiteY0" fmla="*/ 0 h 321084"/>
+                <a:gd name="connsiteX1" fmla="*/ 321586 w 321586"/>
+                <a:gd name="connsiteY1" fmla="*/ 321084 h 321084"/>
+              </a:gdLst>
+              <a:ahLst/>
+              <a:cxnLst>
+                <a:cxn ang="0">
+                  <a:pos x="connsiteX0" y="connsiteY0"/>
+                </a:cxn>
+                <a:cxn ang="0">
+                  <a:pos x="connsiteX1" y="connsiteY1"/>
+                </a:cxn>
+              </a:cxnLst>
+              <a:rect l="l" t="t" r="r" b="b"/>
+              <a:pathLst>
+                <a:path w="321586" h="321084">
+                  <a:moveTo>
+                    <a:pt x="0" y="0"/>
+                  </a:moveTo>
+                  <a:cubicBezTo>
+                    <a:pt x="177607" y="0"/>
+                    <a:pt x="321586" y="143754"/>
+                    <a:pt x="321586" y="321084"/>
+                  </a:cubicBezTo>
+                </a:path>
+              </a:pathLst>
+            </a:custGeom>
+            <a:noFill/>
+            <a:ln>
+              <a:solidFill>
+                <a:schemeClr val="accent6">
+                  <a:lumMod val="75000"/>
+                </a:schemeClr>
+              </a:solidFill>
+              <a:tailEnd type="triangle"/>
+            </a:ln>
+          </p:spPr>
+          <p:style>
+            <a:lnRef idx="2">
+              <a:schemeClr val="accent1">
+                <a:shade val="50000"/>
+              </a:schemeClr>
+            </a:lnRef>
+            <a:fillRef idx="1">
+              <a:schemeClr val="accent1"/>
+            </a:fillRef>
+            <a:effectRef idx="0">
+              <a:schemeClr val="accent1"/>
+            </a:effectRef>
+            <a:fontRef idx="minor">
+              <a:schemeClr val="lt1"/>
+            </a:fontRef>
+          </p:style>
+          <p:txBody>
+            <a:bodyPr rtlCol="0" anchor="ctr"/>
+            <a:lstStyle/>
+            <a:p>
+              <a:pPr algn="ctr"/>
+              <a:endParaRPr lang="en-SG"/>
+            </a:p>
+          </p:txBody>
+        </p:sp>
+        <p:cxnSp>
+          <p:nvCxnSpPr>
+            <p:cNvPr id="24" name="Straight Arrow Connector 23">
+              <a:extLst>
+                <a:ext uri="{FF2B5EF4-FFF2-40B4-BE49-F238E27FC236}">
+                  <a16:creationId xmlns:a16="http://schemas.microsoft.com/office/drawing/2014/main" id="{6A4D9EE7-40F0-FADF-6151-538B4629067D}"/>
+                </a:ext>
+              </a:extLst>
+            </p:cNvPr>
+            <p:cNvCxnSpPr>
+              <a:cxnSpLocks/>
+              <a:stCxn id="5" idx="2"/>
+              <a:endCxn id="17" idx="0"/>
+            </p:cNvCxnSpPr>
+            <p:nvPr/>
+          </p:nvCxnSpPr>
+          <p:spPr>
+            <a:xfrm>
+              <a:off x="6980686" y="3130488"/>
+              <a:ext cx="0" cy="1364787"/>
+            </a:xfrm>
+            <a:prstGeom prst="straightConnector1">
+              <a:avLst/>
+            </a:prstGeom>
+            <a:ln>
+              <a:solidFill>
+                <a:schemeClr val="accent3">
+                  <a:lumMod val="75000"/>
+                </a:schemeClr>
+              </a:solidFill>
+              <a:headEnd type="triangle"/>
+              <a:tailEnd type="triangle"/>
+            </a:ln>
+          </p:spPr>
+          <p:style>
+            <a:lnRef idx="1">
+              <a:schemeClr val="accent1"/>
+            </a:lnRef>
+            <a:fillRef idx="0">
+              <a:schemeClr val="accent1"/>
+            </a:fillRef>
+            <a:effectRef idx="0">
+              <a:schemeClr val="accent1"/>
+            </a:effectRef>
+            <a:fontRef idx="minor">
+              <a:schemeClr val="tx1"/>
+            </a:fontRef>
+          </p:style>
+        </p:cxnSp>
+        <p:sp>
+          <p:nvSpPr>
+            <p:cNvPr id="26" name="Oval 11">
+              <a:extLst>
+                <a:ext uri="{FF2B5EF4-FFF2-40B4-BE49-F238E27FC236}">
+                  <a16:creationId xmlns:a16="http://schemas.microsoft.com/office/drawing/2014/main" id="{5EC35E94-F3E6-FC63-068E-6ABCCB7F86CD}"/>
+                </a:ext>
+              </a:extLst>
+            </p:cNvPr>
+            <p:cNvSpPr>
+              <a:spLocks noChangeAspect="1"/>
+            </p:cNvSpPr>
+            <p:nvPr/>
+          </p:nvSpPr>
+          <p:spPr>
+            <a:xfrm rot="2645410">
+              <a:off x="7108232" y="3942855"/>
+              <a:ext cx="1100929" cy="1099210"/>
+            </a:xfrm>
+            <a:custGeom>
+              <a:avLst/>
+              <a:gdLst>
+                <a:gd name="connsiteX0" fmla="*/ 0 w 643171"/>
+                <a:gd name="connsiteY0" fmla="*/ 321084 h 642168"/>
+                <a:gd name="connsiteX1" fmla="*/ 321586 w 643171"/>
+                <a:gd name="connsiteY1" fmla="*/ 0 h 642168"/>
+                <a:gd name="connsiteX2" fmla="*/ 643172 w 643171"/>
+                <a:gd name="connsiteY2" fmla="*/ 321084 h 642168"/>
+                <a:gd name="connsiteX3" fmla="*/ 321586 w 643171"/>
+                <a:gd name="connsiteY3" fmla="*/ 642168 h 642168"/>
+                <a:gd name="connsiteX4" fmla="*/ 0 w 643171"/>
+                <a:gd name="connsiteY4" fmla="*/ 321084 h 642168"/>
+                <a:gd name="connsiteX0" fmla="*/ 0 w 643172"/>
+                <a:gd name="connsiteY0" fmla="*/ 321084 h 642168"/>
+                <a:gd name="connsiteX1" fmla="*/ 321586 w 643172"/>
+                <a:gd name="connsiteY1" fmla="*/ 0 h 642168"/>
+                <a:gd name="connsiteX2" fmla="*/ 643172 w 643172"/>
+                <a:gd name="connsiteY2" fmla="*/ 321084 h 642168"/>
+                <a:gd name="connsiteX3" fmla="*/ 321586 w 643172"/>
+                <a:gd name="connsiteY3" fmla="*/ 642168 h 642168"/>
+                <a:gd name="connsiteX4" fmla="*/ 91440 w 643172"/>
+                <a:gd name="connsiteY4" fmla="*/ 412524 h 642168"/>
+                <a:gd name="connsiteX0" fmla="*/ 258485 w 580071"/>
+                <a:gd name="connsiteY0" fmla="*/ 0 h 642168"/>
+                <a:gd name="connsiteX1" fmla="*/ 580071 w 580071"/>
+                <a:gd name="connsiteY1" fmla="*/ 321084 h 642168"/>
+                <a:gd name="connsiteX2" fmla="*/ 258485 w 580071"/>
+                <a:gd name="connsiteY2" fmla="*/ 642168 h 642168"/>
+                <a:gd name="connsiteX3" fmla="*/ 28339 w 580071"/>
+                <a:gd name="connsiteY3" fmla="*/ 412524 h 642168"/>
+                <a:gd name="connsiteX0" fmla="*/ 0 w 321586"/>
+                <a:gd name="connsiteY0" fmla="*/ 0 h 642168"/>
+                <a:gd name="connsiteX1" fmla="*/ 321586 w 321586"/>
+                <a:gd name="connsiteY1" fmla="*/ 321084 h 642168"/>
+                <a:gd name="connsiteX2" fmla="*/ 0 w 321586"/>
+                <a:gd name="connsiteY2" fmla="*/ 642168 h 642168"/>
+                <a:gd name="connsiteX0" fmla="*/ 0 w 321586"/>
+                <a:gd name="connsiteY0" fmla="*/ 0 h 321084"/>
+                <a:gd name="connsiteX1" fmla="*/ 321586 w 321586"/>
+                <a:gd name="connsiteY1" fmla="*/ 321084 h 321084"/>
+              </a:gdLst>
+              <a:ahLst/>
+              <a:cxnLst>
+                <a:cxn ang="0">
+                  <a:pos x="connsiteX0" y="connsiteY0"/>
+                </a:cxn>
+                <a:cxn ang="0">
+                  <a:pos x="connsiteX1" y="connsiteY1"/>
+                </a:cxn>
+              </a:cxnLst>
+              <a:rect l="l" t="t" r="r" b="b"/>
+              <a:pathLst>
+                <a:path w="321586" h="321084">
+                  <a:moveTo>
+                    <a:pt x="0" y="0"/>
+                  </a:moveTo>
+                  <a:cubicBezTo>
+                    <a:pt x="177607" y="0"/>
+                    <a:pt x="321586" y="143754"/>
+                    <a:pt x="321586" y="321084"/>
+                  </a:cubicBezTo>
+                </a:path>
+              </a:pathLst>
+            </a:custGeom>
+            <a:noFill/>
+            <a:ln>
+              <a:solidFill>
+                <a:schemeClr val="accent3">
+                  <a:lumMod val="75000"/>
+                </a:schemeClr>
+              </a:solidFill>
+              <a:headEnd type="triangle"/>
+              <a:tailEnd type="triangle"/>
+            </a:ln>
+          </p:spPr>
+          <p:style>
+            <a:lnRef idx="2">
+              <a:schemeClr val="accent1">
+                <a:shade val="50000"/>
+              </a:schemeClr>
+            </a:lnRef>
+            <a:fillRef idx="1">
+              <a:schemeClr val="accent1"/>
+            </a:fillRef>
+            <a:effectRef idx="0">
+              <a:schemeClr val="accent1"/>
+            </a:effectRef>
+            <a:fontRef idx="minor">
+              <a:schemeClr val="lt1"/>
+            </a:fontRef>
+          </p:style>
+          <p:txBody>
+            <a:bodyPr rtlCol="0" anchor="ctr"/>
+            <a:lstStyle/>
+            <a:p>
+              <a:pPr algn="ctr"/>
+              <a:endParaRPr lang="en-SG"/>
+            </a:p>
+          </p:txBody>
+        </p:sp>
+        <p:sp>
+          <p:nvSpPr>
+            <p:cNvPr id="27" name="Oval 11">
+              <a:extLst>
+                <a:ext uri="{FF2B5EF4-FFF2-40B4-BE49-F238E27FC236}">
+                  <a16:creationId xmlns:a16="http://schemas.microsoft.com/office/drawing/2014/main" id="{C36A5A2A-2699-D3AA-8B25-C0F4760E3517}"/>
+                </a:ext>
+              </a:extLst>
+            </p:cNvPr>
+            <p:cNvSpPr>
+              <a:spLocks noChangeAspect="1"/>
+            </p:cNvSpPr>
+            <p:nvPr/>
+          </p:nvSpPr>
+          <p:spPr>
+            <a:xfrm rot="13534588">
+              <a:off x="5778650" y="3958552"/>
+              <a:ext cx="1100311" cy="1098593"/>
+            </a:xfrm>
+            <a:custGeom>
+              <a:avLst/>
+              <a:gdLst>
+                <a:gd name="connsiteX0" fmla="*/ 0 w 643171"/>
+                <a:gd name="connsiteY0" fmla="*/ 321084 h 642168"/>
+                <a:gd name="connsiteX1" fmla="*/ 321586 w 643171"/>
+                <a:gd name="connsiteY1" fmla="*/ 0 h 642168"/>
+                <a:gd name="connsiteX2" fmla="*/ 643172 w 643171"/>
+                <a:gd name="connsiteY2" fmla="*/ 321084 h 642168"/>
+                <a:gd name="connsiteX3" fmla="*/ 321586 w 643171"/>
+                <a:gd name="connsiteY3" fmla="*/ 642168 h 642168"/>
+                <a:gd name="connsiteX4" fmla="*/ 0 w 643171"/>
+                <a:gd name="connsiteY4" fmla="*/ 321084 h 642168"/>
+                <a:gd name="connsiteX0" fmla="*/ 0 w 643172"/>
+                <a:gd name="connsiteY0" fmla="*/ 321084 h 642168"/>
+                <a:gd name="connsiteX1" fmla="*/ 321586 w 643172"/>
+                <a:gd name="connsiteY1" fmla="*/ 0 h 642168"/>
+                <a:gd name="connsiteX2" fmla="*/ 643172 w 643172"/>
+                <a:gd name="connsiteY2" fmla="*/ 321084 h 642168"/>
+                <a:gd name="connsiteX3" fmla="*/ 321586 w 643172"/>
+                <a:gd name="connsiteY3" fmla="*/ 642168 h 642168"/>
+                <a:gd name="connsiteX4" fmla="*/ 91440 w 643172"/>
+                <a:gd name="connsiteY4" fmla="*/ 412524 h 642168"/>
+                <a:gd name="connsiteX0" fmla="*/ 258485 w 580071"/>
+                <a:gd name="connsiteY0" fmla="*/ 0 h 642168"/>
+                <a:gd name="connsiteX1" fmla="*/ 580071 w 580071"/>
+                <a:gd name="connsiteY1" fmla="*/ 321084 h 642168"/>
+                <a:gd name="connsiteX2" fmla="*/ 258485 w 580071"/>
+                <a:gd name="connsiteY2" fmla="*/ 642168 h 642168"/>
+                <a:gd name="connsiteX3" fmla="*/ 28339 w 580071"/>
+                <a:gd name="connsiteY3" fmla="*/ 412524 h 642168"/>
+                <a:gd name="connsiteX0" fmla="*/ 0 w 321586"/>
+                <a:gd name="connsiteY0" fmla="*/ 0 h 642168"/>
+                <a:gd name="connsiteX1" fmla="*/ 321586 w 321586"/>
+                <a:gd name="connsiteY1" fmla="*/ 321084 h 642168"/>
+                <a:gd name="connsiteX2" fmla="*/ 0 w 321586"/>
+                <a:gd name="connsiteY2" fmla="*/ 642168 h 642168"/>
+                <a:gd name="connsiteX0" fmla="*/ 0 w 321586"/>
+                <a:gd name="connsiteY0" fmla="*/ 0 h 321084"/>
+                <a:gd name="connsiteX1" fmla="*/ 321586 w 321586"/>
+                <a:gd name="connsiteY1" fmla="*/ 321084 h 321084"/>
+              </a:gdLst>
+              <a:ahLst/>
+              <a:cxnLst>
+                <a:cxn ang="0">
+                  <a:pos x="connsiteX0" y="connsiteY0"/>
+                </a:cxn>
+                <a:cxn ang="0">
+                  <a:pos x="connsiteX1" y="connsiteY1"/>
+                </a:cxn>
+              </a:cxnLst>
+              <a:rect l="l" t="t" r="r" b="b"/>
+              <a:pathLst>
+                <a:path w="321586" h="321084">
+                  <a:moveTo>
+                    <a:pt x="0" y="0"/>
+                  </a:moveTo>
+                  <a:cubicBezTo>
+                    <a:pt x="177607" y="0"/>
+                    <a:pt x="321586" y="143754"/>
+                    <a:pt x="321586" y="321084"/>
+                  </a:cubicBezTo>
+                </a:path>
+              </a:pathLst>
+            </a:custGeom>
+            <a:noFill/>
+            <a:ln>
+              <a:solidFill>
+                <a:schemeClr val="accent3">
+                  <a:lumMod val="75000"/>
+                </a:schemeClr>
+              </a:solidFill>
+              <a:headEnd type="triangle"/>
+              <a:tailEnd type="triangle" w="med" len="med"/>
+            </a:ln>
+          </p:spPr>
+          <p:style>
+            <a:lnRef idx="2">
+              <a:schemeClr val="accent1">
+                <a:shade val="50000"/>
+              </a:schemeClr>
+            </a:lnRef>
+            <a:fillRef idx="1">
+              <a:schemeClr val="accent1"/>
+            </a:fillRef>
+            <a:effectRef idx="0">
+              <a:schemeClr val="accent1"/>
+            </a:effectRef>
+            <a:fontRef idx="minor">
+              <a:schemeClr val="lt1"/>
+            </a:fontRef>
+          </p:style>
+          <p:txBody>
+            <a:bodyPr rtlCol="0" anchor="ctr"/>
+            <a:lstStyle/>
+            <a:p>
+              <a:pPr algn="ctr"/>
+              <a:endParaRPr lang="en-SG"/>
+            </a:p>
+          </p:txBody>
+        </p:sp>
+        <p:sp>
+          <p:nvSpPr>
+            <p:cNvPr id="64" name="TextBox 63">
+              <a:extLst>
+                <a:ext uri="{FF2B5EF4-FFF2-40B4-BE49-F238E27FC236}">
+                  <a16:creationId xmlns:a16="http://schemas.microsoft.com/office/drawing/2014/main" id="{378F8F54-B118-F1A6-23BE-56D144C244EF}"/>
+                </a:ext>
+              </a:extLst>
+            </p:cNvPr>
+            <p:cNvSpPr txBox="1"/>
+            <p:nvPr/>
+          </p:nvSpPr>
+          <p:spPr>
+            <a:xfrm>
+              <a:off x="7658696" y="2731599"/>
+              <a:ext cx="768159" cy="338554"/>
+            </a:xfrm>
+            <a:prstGeom prst="rect">
+              <a:avLst/>
+            </a:prstGeom>
+            <a:noFill/>
+          </p:spPr>
+          <p:txBody>
+            <a:bodyPr wrap="none" rtlCol="0">
+              <a:spAutoFit/>
+            </a:bodyPr>
+            <a:lstStyle/>
+            <a:p>
+              <a:r>
+                <a:rPr lang="en-SG" sz="1600">
+                  <a:solidFill>
+                    <a:srgbClr val="08A5EF"/>
+                  </a:solidFill>
+                  <a:latin typeface="LM Roman 10" panose="00000500000000000000" pitchFamily="50" charset="0"/>
+                  <a:ea typeface="CMU Serif Upright Italic" panose="02000603000000000000" pitchFamily="2" charset="0"/>
+                  <a:cs typeface="CMU Serif Upright Italic" panose="02000603000000000000" pitchFamily="2" charset="0"/>
+                </a:rPr>
+                <a:t>+(0,1)</a:t>
+              </a:r>
+            </a:p>
+          </p:txBody>
+        </p:sp>
+        <p:cxnSp>
+          <p:nvCxnSpPr>
+            <p:cNvPr id="66" name="Straight Connector 65">
+              <a:extLst>
+                <a:ext uri="{FF2B5EF4-FFF2-40B4-BE49-F238E27FC236}">
+                  <a16:creationId xmlns:a16="http://schemas.microsoft.com/office/drawing/2014/main" id="{02545D2B-51CF-3C23-52E4-D757BC0739B8}"/>
+                </a:ext>
+              </a:extLst>
+            </p:cNvPr>
+            <p:cNvCxnSpPr>
+              <a:cxnSpLocks/>
+            </p:cNvCxnSpPr>
+            <p:nvPr/>
+          </p:nvCxnSpPr>
+          <p:spPr>
+            <a:xfrm flipH="1">
+              <a:off x="7462914" y="2991453"/>
+              <a:ext cx="317500" cy="201304"/>
+            </a:xfrm>
+            <a:prstGeom prst="line">
+              <a:avLst/>
+            </a:prstGeom>
+            <a:ln w="9525">
+              <a:solidFill>
+                <a:schemeClr val="tx1"/>
+              </a:solidFill>
+            </a:ln>
+          </p:spPr>
+          <p:style>
+            <a:lnRef idx="1">
+              <a:schemeClr val="accent1"/>
+            </a:lnRef>
+            <a:fillRef idx="0">
+              <a:schemeClr val="accent1"/>
+            </a:fillRef>
+            <a:effectRef idx="0">
+              <a:schemeClr val="accent1"/>
+            </a:effectRef>
+            <a:fontRef idx="minor">
+              <a:schemeClr val="tx1"/>
+            </a:fontRef>
+          </p:style>
+        </p:cxnSp>
+        <p:sp>
+          <p:nvSpPr>
+            <p:cNvPr id="69" name="TextBox 68">
+              <a:extLst>
+                <a:ext uri="{FF2B5EF4-FFF2-40B4-BE49-F238E27FC236}">
+                  <a16:creationId xmlns:a16="http://schemas.microsoft.com/office/drawing/2014/main" id="{104160E6-CA19-3131-7029-71EA91C88296}"/>
+                </a:ext>
+              </a:extLst>
+            </p:cNvPr>
+            <p:cNvSpPr txBox="1"/>
+            <p:nvPr/>
+          </p:nvSpPr>
+          <p:spPr>
+            <a:xfrm>
+              <a:off x="7712225" y="3548043"/>
+              <a:ext cx="768159" cy="338554"/>
+            </a:xfrm>
+            <a:prstGeom prst="rect">
+              <a:avLst/>
+            </a:prstGeom>
+            <a:noFill/>
+          </p:spPr>
+          <p:txBody>
+            <a:bodyPr wrap="none" rtlCol="0">
+              <a:spAutoFit/>
+            </a:bodyPr>
+            <a:lstStyle/>
+            <a:p>
+              <a:r>
+                <a:rPr lang="en-SG" sz="1600">
+                  <a:solidFill>
+                    <a:schemeClr val="accent3">
+                      <a:lumMod val="75000"/>
+                    </a:schemeClr>
+                  </a:solidFill>
+                  <a:latin typeface="LM Roman 10" panose="00000500000000000000" pitchFamily="50" charset="0"/>
+                  <a:ea typeface="CMU Serif Upright Italic" panose="02000603000000000000" pitchFamily="2" charset="0"/>
+                  <a:cs typeface="CMU Serif Upright Italic" panose="02000603000000000000" pitchFamily="2" charset="0"/>
+                </a:rPr>
+                <a:t>+(1,0)</a:t>
+              </a:r>
+            </a:p>
+          </p:txBody>
+        </p:sp>
+        <p:sp>
+          <p:nvSpPr>
+            <p:cNvPr id="87" name="TextBox 86">
+              <a:extLst>
+                <a:ext uri="{FF2B5EF4-FFF2-40B4-BE49-F238E27FC236}">
+                  <a16:creationId xmlns:a16="http://schemas.microsoft.com/office/drawing/2014/main" id="{3B9ED88C-16DE-F97F-F80E-B3AC05C8CB88}"/>
+                </a:ext>
+              </a:extLst>
+            </p:cNvPr>
+            <p:cNvSpPr txBox="1"/>
+            <p:nvPr/>
+          </p:nvSpPr>
+          <p:spPr>
+            <a:xfrm>
+              <a:off x="7283858" y="5353148"/>
+              <a:ext cx="607859" cy="338554"/>
+            </a:xfrm>
+            <a:prstGeom prst="rect">
+              <a:avLst/>
+            </a:prstGeom>
+            <a:noFill/>
+          </p:spPr>
+          <p:txBody>
+            <a:bodyPr wrap="none" rtlCol="0">
+              <a:spAutoFit/>
+            </a:bodyPr>
+            <a:lstStyle/>
+            <a:p>
+              <a:r>
+                <a:rPr lang="en-SG" sz="1600">
+                  <a:latin typeface="LM Roman 10" panose="00000500000000000000" pitchFamily="50" charset="0"/>
+                  <a:ea typeface="CMU Serif Upright Italic" panose="02000603000000000000" pitchFamily="2" charset="0"/>
+                  <a:cs typeface="CMU Serif Upright Italic" panose="02000603000000000000" pitchFamily="2" charset="0"/>
+                </a:rPr>
+                <a:t>(1,1)</a:t>
+              </a:r>
+            </a:p>
+          </p:txBody>
+        </p:sp>
+        <p:grpSp>
+          <p:nvGrpSpPr>
+            <p:cNvPr id="1260" name="Group 1259">
+              <a:extLst>
+                <a:ext uri="{FF2B5EF4-FFF2-40B4-BE49-F238E27FC236}">
+                  <a16:creationId xmlns:a16="http://schemas.microsoft.com/office/drawing/2014/main" id="{572D98D2-47DA-7C96-7E19-81D2F6A1DAFE}"/>
+                </a:ext>
+              </a:extLst>
+            </p:cNvPr>
+            <p:cNvGrpSpPr/>
+            <p:nvPr/>
+          </p:nvGrpSpPr>
+          <p:grpSpPr>
+            <a:xfrm>
+              <a:off x="8129302" y="3935752"/>
+              <a:ext cx="1702710" cy="1179186"/>
+              <a:chOff x="7945152" y="3935752"/>
+              <a:chExt cx="1702710" cy="1179186"/>
+            </a:xfrm>
+          </p:grpSpPr>
+          <p:sp>
+            <p:nvSpPr>
+              <p:cNvPr id="18" name="TextBox 17">
+                <a:extLst>
+                  <a:ext uri="{FF2B5EF4-FFF2-40B4-BE49-F238E27FC236}">
+                    <a16:creationId xmlns:a16="http://schemas.microsoft.com/office/drawing/2014/main" id="{2AF043EA-7CCC-2F02-B6DE-90F93E083929}"/>
+                  </a:ext>
+                </a:extLst>
+              </p:cNvPr>
+              <p:cNvSpPr txBox="1"/>
+              <p:nvPr/>
+            </p:nvSpPr>
+            <p:spPr>
+              <a:xfrm>
+                <a:off x="7945152" y="3935752"/>
+                <a:ext cx="1702710" cy="338554"/>
+              </a:xfrm>
+              <a:prstGeom prst="rect">
+                <a:avLst/>
+              </a:prstGeom>
+              <a:noFill/>
+            </p:spPr>
+            <p:txBody>
+              <a:bodyPr wrap="none" rtlCol="0">
+                <a:spAutoFit/>
+              </a:bodyPr>
+              <a:lstStyle/>
+              <a:p>
+                <a:r>
+                  <a:rPr lang="en-SG" sz="1600">
+                    <a:latin typeface="LM Roman 10" panose="00000500000000000000" pitchFamily="50" charset="0"/>
+                    <a:ea typeface="CMU Serif Upright Italic" panose="02000603000000000000" pitchFamily="2" charset="0"/>
+                    <a:cs typeface="CMU Serif Upright Italic" panose="02000603000000000000" pitchFamily="2" charset="0"/>
+                  </a:rPr>
+                  <a:t>homomorphism</a:t>
+                </a:r>
+                <a:r>
+                  <a:rPr lang="en-SG" sz="1600" i="1">
+                    <a:latin typeface="LM Roman 10" panose="00000500000000000000" pitchFamily="50" charset="0"/>
+                    <a:ea typeface="CMU Serif Upright Italic" panose="02000603000000000000" pitchFamily="2" charset="0"/>
+                    <a:cs typeface="CMU Serif Upright Italic" panose="02000603000000000000" pitchFamily="2" charset="0"/>
+                  </a:rPr>
+                  <a:t> f</a:t>
+                </a:r>
+              </a:p>
+            </p:txBody>
+          </p:sp>
+          <p:cxnSp>
+            <p:nvCxnSpPr>
+              <p:cNvPr id="71" name="Straight Arrow Connector 70">
+                <a:extLst>
+                  <a:ext uri="{FF2B5EF4-FFF2-40B4-BE49-F238E27FC236}">
+                    <a16:creationId xmlns:a16="http://schemas.microsoft.com/office/drawing/2014/main" id="{24E51F50-845A-4FC6-0D19-53E2DC08D54E}"/>
+                  </a:ext>
+                </a:extLst>
+              </p:cNvPr>
+              <p:cNvCxnSpPr>
+                <a:cxnSpLocks/>
+              </p:cNvCxnSpPr>
+              <p:nvPr/>
+            </p:nvCxnSpPr>
+            <p:spPr>
+              <a:xfrm>
+                <a:off x="8224914" y="4280493"/>
+                <a:ext cx="1123950" cy="0"/>
+              </a:xfrm>
+              <a:prstGeom prst="straightConnector1">
+                <a:avLst/>
+              </a:prstGeom>
+              <a:ln>
+                <a:solidFill>
+                  <a:schemeClr val="tx1"/>
+                </a:solidFill>
+                <a:tailEnd type="triangle"/>
+              </a:ln>
+            </p:spPr>
+            <p:style>
+              <a:lnRef idx="1">
+                <a:schemeClr val="accent1"/>
+              </a:lnRef>
+              <a:fillRef idx="0">
+                <a:schemeClr val="accent1"/>
+              </a:fillRef>
+              <a:effectRef idx="0">
+                <a:schemeClr val="accent1"/>
+              </a:effectRef>
+              <a:fontRef idx="minor">
+                <a:schemeClr val="tx1"/>
+              </a:fontRef>
+            </p:style>
+          </p:cxnSp>
+          <p:sp>
+            <p:nvSpPr>
+              <p:cNvPr id="90" name="TextBox 89">
+                <a:extLst>
+                  <a:ext uri="{FF2B5EF4-FFF2-40B4-BE49-F238E27FC236}">
+                    <a16:creationId xmlns:a16="http://schemas.microsoft.com/office/drawing/2014/main" id="{E8853151-00DE-86CA-50C2-0913D2E5B623}"/>
+                  </a:ext>
+                </a:extLst>
+              </p:cNvPr>
+              <p:cNvSpPr txBox="1"/>
+              <p:nvPr/>
+            </p:nvSpPr>
+            <p:spPr>
+              <a:xfrm>
+                <a:off x="8123576" y="4266303"/>
+                <a:ext cx="1249060" cy="584775"/>
+              </a:xfrm>
+              <a:prstGeom prst="rect">
+                <a:avLst/>
+              </a:prstGeom>
+              <a:noFill/>
+            </p:spPr>
+            <p:txBody>
+              <a:bodyPr wrap="none" rtlCol="0">
+                <a:spAutoFit/>
+              </a:bodyPr>
+              <a:lstStyle/>
+              <a:p>
+                <a:pPr algn="ctr"/>
+                <a:r>
+                  <a:rPr lang="en-SG" sz="1600">
+                    <a:latin typeface="LM Roman 10" panose="00000500000000000000" pitchFamily="50" charset="0"/>
+                    <a:ea typeface="CMU Serif Upright Italic" panose="02000603000000000000" pitchFamily="2" charset="0"/>
+                    <a:cs typeface="CMU Serif Upright Italic" panose="02000603000000000000" pitchFamily="2" charset="0"/>
+                  </a:rPr>
+                  <a:t>from </a:t>
+                </a:r>
+                <a:r>
+                  <a:rPr lang="en-SG" sz="1600" b="0" i="0">
+                    <a:solidFill>
+                      <a:srgbClr val="404040"/>
+                    </a:solidFill>
+                    <a:effectLst/>
+                    <a:latin typeface="-apple-system"/>
+                  </a:rPr>
+                  <a:t>ℤ</a:t>
+                </a:r>
+                <a:r>
+                  <a:rPr lang="en-SG" sz="1600" b="0" baseline="-25000">
+                    <a:solidFill>
+                      <a:srgbClr val="404040"/>
+                    </a:solidFill>
+                    <a:effectLst/>
+                    <a:latin typeface="LM Roman 10" panose="00000500000000000000" pitchFamily="50" charset="0"/>
+                    <a:ea typeface="CMU Serif Upright Italic" panose="02000603000000000000" pitchFamily="2" charset="0"/>
+                    <a:cs typeface="CMU Serif Upright Italic" panose="02000603000000000000" pitchFamily="2" charset="0"/>
+                  </a:rPr>
+                  <a:t>2</a:t>
+                </a:r>
+                <a:r>
+                  <a:rPr lang="en-SG" sz="1600" b="0" i="0">
+                    <a:solidFill>
+                      <a:srgbClr val="FFFFFF"/>
+                    </a:solidFill>
+                    <a:effectLst/>
+                    <a:latin typeface="MathJax_Main"/>
+                  </a:rPr>
+                  <a:t> </a:t>
+                </a:r>
+                <a:r>
+                  <a:rPr lang="en-SG" sz="1600" b="0" i="0">
+                    <a:effectLst/>
+                    <a:latin typeface="MathJax_Main"/>
+                  </a:rPr>
+                  <a:t>×</a:t>
+                </a:r>
+                <a:r>
+                  <a:rPr lang="en-SG" sz="1600" b="0" baseline="-25000">
+                    <a:solidFill>
+                      <a:srgbClr val="404040"/>
+                    </a:solidFill>
+                    <a:effectLst/>
+                    <a:latin typeface="LM Roman 10" panose="00000500000000000000" pitchFamily="50" charset="0"/>
+                    <a:ea typeface="CMU Serif Upright Italic" panose="02000603000000000000" pitchFamily="2" charset="0"/>
+                    <a:cs typeface="CMU Serif Upright Italic" panose="02000603000000000000" pitchFamily="2" charset="0"/>
+                  </a:rPr>
+                  <a:t> </a:t>
+                </a:r>
+                <a:r>
+                  <a:rPr lang="en-SG" sz="1600" b="0" i="0">
+                    <a:solidFill>
+                      <a:srgbClr val="404040"/>
+                    </a:solidFill>
+                    <a:effectLst/>
+                    <a:latin typeface="-apple-system"/>
+                  </a:rPr>
+                  <a:t>ℤ</a:t>
+                </a:r>
+                <a:r>
+                  <a:rPr lang="en-SG" sz="1600" b="0" baseline="-25000">
+                    <a:solidFill>
+                      <a:srgbClr val="404040"/>
+                    </a:solidFill>
+                    <a:effectLst/>
+                    <a:latin typeface="LM Roman 10" panose="00000500000000000000" pitchFamily="50" charset="0"/>
+                    <a:ea typeface="CMU Serif Upright Italic" panose="02000603000000000000" pitchFamily="2" charset="0"/>
+                    <a:cs typeface="CMU Serif Upright Italic" panose="02000603000000000000" pitchFamily="2" charset="0"/>
+                  </a:rPr>
+                  <a:t>3</a:t>
+                </a:r>
+                <a:endParaRPr lang="en-SG" sz="1600">
+                  <a:latin typeface="LM Roman 10" panose="00000500000000000000" pitchFamily="50" charset="0"/>
+                  <a:ea typeface="CMU Serif Upright Italic" panose="02000603000000000000" pitchFamily="2" charset="0"/>
+                  <a:cs typeface="CMU Serif Upright Italic" panose="02000603000000000000" pitchFamily="2" charset="0"/>
+                </a:endParaRPr>
+              </a:p>
+              <a:p>
+                <a:pPr algn="ctr"/>
+                <a:r>
+                  <a:rPr lang="en-SG" sz="1600">
+                    <a:latin typeface="LM Roman 10" panose="00000500000000000000" pitchFamily="50" charset="0"/>
+                    <a:ea typeface="CMU Serif Upright Italic" panose="02000603000000000000" pitchFamily="2" charset="0"/>
+                    <a:cs typeface="CMU Serif Upright Italic" panose="02000603000000000000" pitchFamily="2" charset="0"/>
+                  </a:rPr>
+                  <a:t>into </a:t>
+                </a:r>
+                <a:r>
+                  <a:rPr lang="en-SG" sz="1600" b="0" i="0">
+                    <a:solidFill>
+                      <a:srgbClr val="404040"/>
+                    </a:solidFill>
+                    <a:effectLst/>
+                    <a:latin typeface="-apple-system"/>
+                  </a:rPr>
+                  <a:t>ℤ</a:t>
+                </a:r>
+                <a:r>
+                  <a:rPr lang="en-SG" sz="1600" b="0" baseline="-25000">
+                    <a:solidFill>
+                      <a:srgbClr val="404040"/>
+                    </a:solidFill>
+                    <a:effectLst/>
+                    <a:latin typeface="LM Roman 10" panose="00000500000000000000" pitchFamily="50" charset="0"/>
+                    <a:ea typeface="CMU Serif Upright Italic" panose="02000603000000000000" pitchFamily="2" charset="0"/>
+                    <a:cs typeface="CMU Serif Upright Italic" panose="02000603000000000000" pitchFamily="2" charset="0"/>
+                  </a:rPr>
+                  <a:t>2</a:t>
+                </a:r>
+                <a:r>
+                  <a:rPr lang="en-SG" sz="1600" baseline="-25000">
+                    <a:solidFill>
+                      <a:srgbClr val="404040"/>
+                    </a:solidFill>
+                    <a:latin typeface="LM Roman 10" panose="00000500000000000000" pitchFamily="50" charset="0"/>
+                    <a:ea typeface="CMU Serif Upright Italic" panose="02000603000000000000" pitchFamily="2" charset="0"/>
+                    <a:cs typeface="CMU Serif Upright Italic" panose="02000603000000000000" pitchFamily="2" charset="0"/>
+                  </a:rPr>
+                  <a:t> </a:t>
+                </a:r>
+                <a:endParaRPr lang="en-SG" sz="1600">
+                  <a:latin typeface="LM Roman 10" panose="00000500000000000000" pitchFamily="50" charset="0"/>
+                  <a:ea typeface="CMU Serif Upright Italic" panose="02000603000000000000" pitchFamily="2" charset="0"/>
+                  <a:cs typeface="CMU Serif Upright Italic" panose="02000603000000000000" pitchFamily="2" charset="0"/>
+                </a:endParaRPr>
+              </a:p>
+            </p:txBody>
+          </p:sp>
+          <p:sp>
+            <p:nvSpPr>
+              <p:cNvPr id="94" name="TextBox 93">
+                <a:extLst>
+                  <a:ext uri="{FF2B5EF4-FFF2-40B4-BE49-F238E27FC236}">
+                    <a16:creationId xmlns:a16="http://schemas.microsoft.com/office/drawing/2014/main" id="{EF00A29A-B23F-B4C5-7F1C-BA001D2603F3}"/>
+                  </a:ext>
+                </a:extLst>
+              </p:cNvPr>
+              <p:cNvSpPr txBox="1"/>
+              <p:nvPr/>
+            </p:nvSpPr>
+            <p:spPr>
+              <a:xfrm>
+                <a:off x="8184657" y="4776384"/>
+                <a:ext cx="1086195" cy="338554"/>
+              </a:xfrm>
+              <a:prstGeom prst="rect">
+                <a:avLst/>
+              </a:prstGeom>
+              <a:noFill/>
+            </p:spPr>
+            <p:txBody>
+              <a:bodyPr wrap="none" rtlCol="0">
+                <a:spAutoFit/>
+              </a:bodyPr>
+              <a:lstStyle/>
+              <a:p>
+                <a:pPr algn="ctr"/>
+                <a:r>
+                  <a:rPr lang="en-SG" sz="1600">
+                    <a:latin typeface="LM Roman 10" panose="00000500000000000000" pitchFamily="50" charset="0"/>
+                    <a:ea typeface="CMU Serif Upright Italic" panose="02000603000000000000" pitchFamily="2" charset="0"/>
+                    <a:cs typeface="CMU Serif Upright Italic" panose="02000603000000000000" pitchFamily="2" charset="0"/>
+                  </a:rPr>
+                  <a:t>ker </a:t>
+                </a:r>
+                <a:r>
+                  <a:rPr lang="en-SG" sz="1600" i="1">
+                    <a:latin typeface="LM Roman 10" panose="00000500000000000000" pitchFamily="50" charset="0"/>
+                    <a:ea typeface="CMU Serif Upright Italic" panose="02000603000000000000" pitchFamily="2" charset="0"/>
+                    <a:cs typeface="CMU Serif Upright Italic" panose="02000603000000000000" pitchFamily="2" charset="0"/>
+                  </a:rPr>
+                  <a:t>f </a:t>
+                </a:r>
+                <a:r>
+                  <a:rPr lang="en-SG" sz="1600">
+                    <a:latin typeface="LM Roman 10" panose="00000500000000000000" pitchFamily="50" charset="0"/>
+                    <a:ea typeface="CMU Serif Upright Italic" panose="02000603000000000000" pitchFamily="2" charset="0"/>
+                    <a:cs typeface="CMU Serif Upright Italic" panose="02000603000000000000" pitchFamily="2" charset="0"/>
+                  </a:rPr>
+                  <a:t>= </a:t>
+                </a:r>
+                <a:r>
+                  <a:rPr lang="en-SG" sz="1600" b="0" i="0">
+                    <a:solidFill>
+                      <a:srgbClr val="404040"/>
+                    </a:solidFill>
+                    <a:effectLst/>
+                    <a:latin typeface="-apple-system"/>
+                  </a:rPr>
+                  <a:t>ℤ</a:t>
+                </a:r>
+                <a:r>
+                  <a:rPr lang="en-SG" sz="1600" b="0" baseline="-25000">
+                    <a:solidFill>
+                      <a:srgbClr val="404040"/>
+                    </a:solidFill>
+                    <a:effectLst/>
+                    <a:latin typeface="LM Roman 10" panose="00000500000000000000" pitchFamily="50" charset="0"/>
+                    <a:ea typeface="CMU Serif Upright Italic" panose="02000603000000000000" pitchFamily="2" charset="0"/>
+                    <a:cs typeface="CMU Serif Upright Italic" panose="02000603000000000000" pitchFamily="2" charset="0"/>
+                  </a:rPr>
+                  <a:t>3</a:t>
+                </a:r>
+                <a:endParaRPr lang="en-SG" sz="1600">
+                  <a:latin typeface="LM Roman 10" panose="00000500000000000000" pitchFamily="50" charset="0"/>
+                  <a:ea typeface="CMU Serif Upright Italic" panose="02000603000000000000" pitchFamily="2" charset="0"/>
+                  <a:cs typeface="CMU Serif Upright Italic" panose="02000603000000000000" pitchFamily="2" charset="0"/>
+                </a:endParaRPr>
+              </a:p>
+            </p:txBody>
+          </p:sp>
+        </p:grpSp>
+        <p:sp>
+          <p:nvSpPr>
+            <p:cNvPr id="1252" name="TextBox 1251">
+              <a:extLst>
+                <a:ext uri="{FF2B5EF4-FFF2-40B4-BE49-F238E27FC236}">
+                  <a16:creationId xmlns:a16="http://schemas.microsoft.com/office/drawing/2014/main" id="{C4692F8B-2E4E-2A53-9615-7512AD0081E5}"/>
+                </a:ext>
+              </a:extLst>
+            </p:cNvPr>
+            <p:cNvSpPr txBox="1"/>
+            <p:nvPr/>
+          </p:nvSpPr>
+          <p:spPr>
+            <a:xfrm>
+              <a:off x="9711681" y="3217492"/>
+              <a:ext cx="2141933" cy="338554"/>
+            </a:xfrm>
+            <a:prstGeom prst="rect">
+              <a:avLst/>
+            </a:prstGeom>
+            <a:noFill/>
+          </p:spPr>
+          <p:txBody>
+            <a:bodyPr wrap="none" rtlCol="0">
+              <a:spAutoFit/>
+            </a:bodyPr>
+            <a:lstStyle/>
+            <a:p>
+              <a:r>
+                <a:rPr lang="en-SG" sz="1600">
+                  <a:latin typeface="LM Roman 10" panose="00000500000000000000" pitchFamily="50" charset="0"/>
+                  <a:ea typeface="CMU Serif Upright Italic" panose="02000603000000000000" pitchFamily="2" charset="0"/>
+                  <a:cs typeface="CMU Serif Upright Italic" panose="02000603000000000000" pitchFamily="2" charset="0"/>
+                </a:rPr>
+                <a:t>0: {(0,0), (0,1), (0,2)}</a:t>
+              </a:r>
+            </a:p>
+          </p:txBody>
+        </p:sp>
+        <p:sp>
+          <p:nvSpPr>
+            <p:cNvPr id="1254" name="TextBox 1253">
+              <a:extLst>
+                <a:ext uri="{FF2B5EF4-FFF2-40B4-BE49-F238E27FC236}">
+                  <a16:creationId xmlns:a16="http://schemas.microsoft.com/office/drawing/2014/main" id="{78A37B11-012E-1207-083B-138A11A59E41}"/>
+                </a:ext>
+              </a:extLst>
+            </p:cNvPr>
+            <p:cNvSpPr txBox="1"/>
+            <p:nvPr/>
+          </p:nvSpPr>
+          <p:spPr>
+            <a:xfrm>
+              <a:off x="9711680" y="5089878"/>
+              <a:ext cx="2141933" cy="338554"/>
+            </a:xfrm>
+            <a:prstGeom prst="rect">
+              <a:avLst/>
+            </a:prstGeom>
+            <a:noFill/>
+          </p:spPr>
+          <p:txBody>
+            <a:bodyPr wrap="none" rtlCol="0">
+              <a:spAutoFit/>
+            </a:bodyPr>
+            <a:lstStyle/>
+            <a:p>
+              <a:r>
+                <a:rPr lang="en-SG" sz="1600">
+                  <a:latin typeface="LM Roman 10" panose="00000500000000000000" pitchFamily="50" charset="0"/>
+                  <a:ea typeface="CMU Serif Upright Italic" panose="02000603000000000000" pitchFamily="2" charset="0"/>
+                  <a:cs typeface="CMU Serif Upright Italic" panose="02000603000000000000" pitchFamily="2" charset="0"/>
+                </a:rPr>
+                <a:t>1: {(1,0), (1,1), (1,2)}</a:t>
+              </a:r>
+            </a:p>
+          </p:txBody>
+        </p:sp>
+        <p:cxnSp>
+          <p:nvCxnSpPr>
+            <p:cNvPr id="1257" name="Straight Arrow Connector 1256">
+              <a:extLst>
+                <a:ext uri="{FF2B5EF4-FFF2-40B4-BE49-F238E27FC236}">
+                  <a16:creationId xmlns:a16="http://schemas.microsoft.com/office/drawing/2014/main" id="{EEE6014E-3B34-7746-2DBC-CE548B524E7D}"/>
+                </a:ext>
+              </a:extLst>
+            </p:cNvPr>
+            <p:cNvCxnSpPr>
+              <a:cxnSpLocks/>
+            </p:cNvCxnSpPr>
+            <p:nvPr/>
+          </p:nvCxnSpPr>
+          <p:spPr>
+            <a:xfrm>
+              <a:off x="10070141" y="3595332"/>
+              <a:ext cx="0" cy="1494546"/>
+            </a:xfrm>
+            <a:prstGeom prst="straightConnector1">
+              <a:avLst/>
+            </a:prstGeom>
+            <a:ln>
+              <a:solidFill>
+                <a:schemeClr val="accent3">
+                  <a:lumMod val="75000"/>
+                </a:schemeClr>
+              </a:solidFill>
+              <a:headEnd type="triangle"/>
+              <a:tailEnd type="triangle"/>
+            </a:ln>
+          </p:spPr>
+          <p:style>
+            <a:lnRef idx="1">
+              <a:schemeClr val="accent1"/>
+            </a:lnRef>
+            <a:fillRef idx="0">
+              <a:schemeClr val="accent1"/>
+            </a:fillRef>
+            <a:effectRef idx="0">
+              <a:schemeClr val="accent1"/>
+            </a:effectRef>
+            <a:fontRef idx="minor">
+              <a:schemeClr val="tx1"/>
+            </a:fontRef>
+          </p:style>
+        </p:cxnSp>
+        <p:sp>
+          <p:nvSpPr>
+            <p:cNvPr id="1259" name="TextBox 1258">
+              <a:extLst>
+                <a:ext uri="{FF2B5EF4-FFF2-40B4-BE49-F238E27FC236}">
+                  <a16:creationId xmlns:a16="http://schemas.microsoft.com/office/drawing/2014/main" id="{53042204-6CAA-6432-34B6-ADB6E76E0D27}"/>
+                </a:ext>
+              </a:extLst>
+            </p:cNvPr>
+            <p:cNvSpPr txBox="1"/>
+            <p:nvPr/>
+          </p:nvSpPr>
+          <p:spPr>
+            <a:xfrm>
+              <a:off x="10026854" y="4169294"/>
+              <a:ext cx="447558" cy="338554"/>
+            </a:xfrm>
+            <a:prstGeom prst="rect">
+              <a:avLst/>
+            </a:prstGeom>
+            <a:noFill/>
+          </p:spPr>
+          <p:txBody>
+            <a:bodyPr wrap="none" rtlCol="0">
+              <a:spAutoFit/>
+            </a:bodyPr>
+            <a:lstStyle/>
+            <a:p>
+              <a:r>
+                <a:rPr lang="en-SG" sz="1600">
+                  <a:solidFill>
+                    <a:schemeClr val="accent3">
+                      <a:lumMod val="75000"/>
+                    </a:schemeClr>
+                  </a:solidFill>
+                  <a:latin typeface="LM Roman 10" panose="00000500000000000000" pitchFamily="50" charset="0"/>
+                  <a:ea typeface="CMU Serif Upright Italic" panose="02000603000000000000" pitchFamily="2" charset="0"/>
+                  <a:cs typeface="CMU Serif Upright Italic" panose="02000603000000000000" pitchFamily="2" charset="0"/>
+                </a:rPr>
+                <a:t>+1</a:t>
+              </a:r>
+            </a:p>
+          </p:txBody>
+        </p:sp>
+        <p:cxnSp>
+          <p:nvCxnSpPr>
+            <p:cNvPr id="1268" name="Straight Arrow Connector 1267">
+              <a:extLst>
+                <a:ext uri="{FF2B5EF4-FFF2-40B4-BE49-F238E27FC236}">
+                  <a16:creationId xmlns:a16="http://schemas.microsoft.com/office/drawing/2014/main" id="{6497BD5C-E264-ACC7-2299-1210F24E4A27}"/>
+                </a:ext>
+              </a:extLst>
+            </p:cNvPr>
+            <p:cNvCxnSpPr>
+              <a:cxnSpLocks/>
+            </p:cNvCxnSpPr>
+            <p:nvPr/>
+          </p:nvCxnSpPr>
+          <p:spPr>
+            <a:xfrm>
+              <a:off x="7780414" y="3407573"/>
+              <a:ext cx="1931267" cy="0"/>
+            </a:xfrm>
+            <a:prstGeom prst="straightConnector1">
+              <a:avLst/>
+            </a:prstGeom>
+            <a:ln>
+              <a:solidFill>
+                <a:schemeClr val="bg1">
+                  <a:lumMod val="75000"/>
+                </a:schemeClr>
+              </a:solidFill>
+              <a:prstDash val="dash"/>
+              <a:tailEnd type="triangle"/>
+            </a:ln>
+          </p:spPr>
+          <p:style>
+            <a:lnRef idx="1">
+              <a:schemeClr val="accent1"/>
+            </a:lnRef>
+            <a:fillRef idx="0">
+              <a:schemeClr val="accent1"/>
+            </a:fillRef>
+            <a:effectRef idx="0">
+              <a:schemeClr val="accent1"/>
+            </a:effectRef>
+            <a:fontRef idx="minor">
+              <a:schemeClr val="tx1"/>
+            </a:fontRef>
+          </p:style>
+        </p:cxnSp>
+        <p:cxnSp>
+          <p:nvCxnSpPr>
+            <p:cNvPr id="1273" name="Straight Arrow Connector 1272">
+              <a:extLst>
+                <a:ext uri="{FF2B5EF4-FFF2-40B4-BE49-F238E27FC236}">
+                  <a16:creationId xmlns:a16="http://schemas.microsoft.com/office/drawing/2014/main" id="{A05BE2D3-86B8-024F-B6AC-CF9775BCE340}"/>
+                </a:ext>
+              </a:extLst>
+            </p:cNvPr>
+            <p:cNvCxnSpPr>
+              <a:cxnSpLocks/>
+            </p:cNvCxnSpPr>
+            <p:nvPr/>
+          </p:nvCxnSpPr>
+          <p:spPr>
+            <a:xfrm>
+              <a:off x="7780414" y="5285246"/>
+              <a:ext cx="1931267" cy="0"/>
+            </a:xfrm>
+            <a:prstGeom prst="straightConnector1">
+              <a:avLst/>
+            </a:prstGeom>
+            <a:ln>
+              <a:solidFill>
+                <a:schemeClr val="bg1">
+                  <a:lumMod val="75000"/>
+                </a:schemeClr>
+              </a:solidFill>
+              <a:prstDash val="dash"/>
+              <a:tailEnd type="triangle"/>
+            </a:ln>
+          </p:spPr>
+          <p:style>
+            <a:lnRef idx="1">
+              <a:schemeClr val="accent1"/>
+            </a:lnRef>
+            <a:fillRef idx="0">
+              <a:schemeClr val="accent1"/>
+            </a:fillRef>
+            <a:effectRef idx="0">
+              <a:schemeClr val="accent1"/>
+            </a:effectRef>
+            <a:fontRef idx="minor">
+              <a:schemeClr val="tx1"/>
+            </a:fontRef>
+          </p:style>
+        </p:cxnSp>
+      </p:grpSp>
     </p:spTree>
     <p:extLst>
       <p:ext uri="{BB962C8B-B14F-4D97-AF65-F5344CB8AC3E}">

</xml_diff>